<commit_message>
feat: update for backend portfolio
</commit_message>
<xml_diff>
--- a/IT 백엔드 포트폴리오 유태규.pptx
+++ b/IT 백엔드 포트폴리오 유태규.pptx
@@ -5,34 +5,36 @@
     <p:sldMasterId id="2147483659" r:id="rId1"/>
   </p:sldMasterIdLst>
   <p:notesMasterIdLst>
-    <p:notesMasterId r:id="rId6"/>
+    <p:notesMasterId r:id="rId8"/>
   </p:notesMasterIdLst>
   <p:sldIdLst>
     <p:sldId id="258" r:id="rId2"/>
     <p:sldId id="268" r:id="rId3"/>
     <p:sldId id="269" r:id="rId4"/>
     <p:sldId id="270" r:id="rId5"/>
+    <p:sldId id="272" r:id="rId6"/>
+    <p:sldId id="271" r:id="rId7"/>
   </p:sldIdLst>
   <p:sldSz cx="7559675" cy="10691813"/>
   <p:notesSz cx="6858000" cy="9144000"/>
   <p:embeddedFontLst>
     <p:embeddedFont>
       <p:font typeface="Gothic A1" panose="020B0600000101010101" charset="-127"/>
-      <p:regular r:id="rId7"/>
-      <p:bold r:id="rId8"/>
+      <p:regular r:id="rId9"/>
+      <p:bold r:id="rId10"/>
     </p:embeddedFont>
     <p:embeddedFont>
       <p:font typeface="Gothic A1 Black" panose="020B0600000101010101" charset="-127"/>
-      <p:bold r:id="rId9"/>
+      <p:bold r:id="rId11"/>
     </p:embeddedFont>
     <p:embeddedFont>
       <p:font typeface="Gothic A1 ExtraBold" panose="020B0600000101010101" charset="-127"/>
-      <p:bold r:id="rId10"/>
+      <p:bold r:id="rId12"/>
     </p:embeddedFont>
     <p:embeddedFont>
       <p:font typeface="맑은 고딕" panose="020B0503020000020004" pitchFamily="50" charset="-127"/>
-      <p:regular r:id="rId11"/>
-      <p:bold r:id="rId12"/>
+      <p:regular r:id="rId13"/>
+      <p:bold r:id="rId14"/>
     </p:embeddedFont>
   </p:embeddedFontLst>
   <p:defaultTextStyle>
@@ -1171,6 +1173,224 @@
     <p:extLst>
       <p:ext uri="{BB962C8B-B14F-4D97-AF65-F5344CB8AC3E}">
         <p14:creationId xmlns:p14="http://schemas.microsoft.com/office/powerpoint/2010/main" val="961197922"/>
+      </p:ext>
+    </p:extLst>
+  </p:cSld>
+  <p:clrMapOvr>
+    <a:masterClrMapping/>
+  </p:clrMapOvr>
+</p:notes>
+</file>
+
+<file path=ppt/notesSlides/notesSlide5.xml><?xml version="1.0" encoding="utf-8"?>
+<p:notes xmlns:a="http://schemas.openxmlformats.org/drawingml/2006/main" xmlns:r="http://schemas.openxmlformats.org/officeDocument/2006/relationships" xmlns:p="http://schemas.openxmlformats.org/presentationml/2006/main" showMasterSp="0" showMasterPhAnim="0">
+  <p:cSld>
+    <p:spTree>
+      <p:nvGrpSpPr>
+        <p:cNvPr id="1" name="Shape 171"/>
+        <p:cNvGrpSpPr/>
+        <p:nvPr/>
+      </p:nvGrpSpPr>
+      <p:grpSpPr>
+        <a:xfrm>
+          <a:off x="0" y="0"/>
+          <a:ext cx="0" cy="0"/>
+          <a:chOff x="0" y="0"/>
+          <a:chExt cx="0" cy="0"/>
+        </a:xfrm>
+      </p:grpSpPr>
+      <p:sp>
+        <p:nvSpPr>
+          <p:cNvPr id="172" name="Google Shape;172;g7d8fae7b61_0_124:notes"/>
+          <p:cNvSpPr>
+            <a:spLocks noGrp="1" noRot="1" noChangeAspect="1"/>
+          </p:cNvSpPr>
+          <p:nvPr>
+            <p:ph type="sldImg" idx="2"/>
+          </p:nvPr>
+        </p:nvSpPr>
+        <p:spPr>
+          <a:xfrm>
+            <a:off x="2217738" y="685800"/>
+            <a:ext cx="2424112" cy="3429000"/>
+          </a:xfrm>
+          <a:custGeom>
+            <a:avLst/>
+            <a:gdLst/>
+            <a:ahLst/>
+            <a:cxnLst/>
+            <a:rect l="l" t="t" r="r" b="b"/>
+            <a:pathLst>
+              <a:path w="120000" h="120000" extrusionOk="0">
+                <a:moveTo>
+                  <a:pt x="0" y="0"/>
+                </a:moveTo>
+                <a:lnTo>
+                  <a:pt x="120000" y="0"/>
+                </a:lnTo>
+                <a:lnTo>
+                  <a:pt x="120000" y="120000"/>
+                </a:lnTo>
+                <a:lnTo>
+                  <a:pt x="0" y="120000"/>
+                </a:lnTo>
+                <a:close/>
+              </a:path>
+            </a:pathLst>
+          </a:custGeom>
+        </p:spPr>
+      </p:sp>
+      <p:sp>
+        <p:nvSpPr>
+          <p:cNvPr id="173" name="Google Shape;173;g7d8fae7b61_0_124:notes"/>
+          <p:cNvSpPr txBox="1">
+            <a:spLocks noGrp="1"/>
+          </p:cNvSpPr>
+          <p:nvPr>
+            <p:ph type="body" idx="1"/>
+          </p:nvPr>
+        </p:nvSpPr>
+        <p:spPr>
+          <a:xfrm>
+            <a:off x="685800" y="4343400"/>
+            <a:ext cx="5486400" cy="4114800"/>
+          </a:xfrm>
+          <a:prstGeom prst="rect">
+            <a:avLst/>
+          </a:prstGeom>
+        </p:spPr>
+        <p:txBody>
+          <a:bodyPr spcFirstLastPara="1" wrap="square" lIns="91425" tIns="91425" rIns="91425" bIns="91425" anchor="t" anchorCtr="0">
+            <a:noAutofit/>
+          </a:bodyPr>
+          <a:lstStyle/>
+          <a:p>
+            <a:pPr marL="0" lvl="0" indent="0" algn="l" rtl="0">
+              <a:spcBef>
+                <a:spcPts val="0"/>
+              </a:spcBef>
+              <a:spcAft>
+                <a:spcPts val="0"/>
+              </a:spcAft>
+              <a:buNone/>
+            </a:pPr>
+            <a:endParaRPr dirty="0"/>
+          </a:p>
+        </p:txBody>
+      </p:sp>
+    </p:spTree>
+    <p:extLst>
+      <p:ext uri="{BB962C8B-B14F-4D97-AF65-F5344CB8AC3E}">
+        <p14:creationId xmlns:p14="http://schemas.microsoft.com/office/powerpoint/2010/main" val="2938489559"/>
+      </p:ext>
+    </p:extLst>
+  </p:cSld>
+  <p:clrMapOvr>
+    <a:masterClrMapping/>
+  </p:clrMapOvr>
+</p:notes>
+</file>
+
+<file path=ppt/notesSlides/notesSlide6.xml><?xml version="1.0" encoding="utf-8"?>
+<p:notes xmlns:a="http://schemas.openxmlformats.org/drawingml/2006/main" xmlns:r="http://schemas.openxmlformats.org/officeDocument/2006/relationships" xmlns:p="http://schemas.openxmlformats.org/presentationml/2006/main" showMasterSp="0" showMasterPhAnim="0">
+  <p:cSld>
+    <p:spTree>
+      <p:nvGrpSpPr>
+        <p:cNvPr id="1" name="Shape 188"/>
+        <p:cNvGrpSpPr/>
+        <p:nvPr/>
+      </p:nvGrpSpPr>
+      <p:grpSpPr>
+        <a:xfrm>
+          <a:off x="0" y="0"/>
+          <a:ext cx="0" cy="0"/>
+          <a:chOff x="0" y="0"/>
+          <a:chExt cx="0" cy="0"/>
+        </a:xfrm>
+      </p:grpSpPr>
+      <p:sp>
+        <p:nvSpPr>
+          <p:cNvPr id="189" name="Google Shape;189;g7d8fae7b61_0_145:notes"/>
+          <p:cNvSpPr>
+            <a:spLocks noGrp="1" noRot="1" noChangeAspect="1"/>
+          </p:cNvSpPr>
+          <p:nvPr>
+            <p:ph type="sldImg" idx="2"/>
+          </p:nvPr>
+        </p:nvSpPr>
+        <p:spPr>
+          <a:xfrm>
+            <a:off x="2217738" y="685800"/>
+            <a:ext cx="2424112" cy="3429000"/>
+          </a:xfrm>
+          <a:custGeom>
+            <a:avLst/>
+            <a:gdLst/>
+            <a:ahLst/>
+            <a:cxnLst/>
+            <a:rect l="l" t="t" r="r" b="b"/>
+            <a:pathLst>
+              <a:path w="120000" h="120000" extrusionOk="0">
+                <a:moveTo>
+                  <a:pt x="0" y="0"/>
+                </a:moveTo>
+                <a:lnTo>
+                  <a:pt x="120000" y="0"/>
+                </a:lnTo>
+                <a:lnTo>
+                  <a:pt x="120000" y="120000"/>
+                </a:lnTo>
+                <a:lnTo>
+                  <a:pt x="0" y="120000"/>
+                </a:lnTo>
+                <a:close/>
+              </a:path>
+            </a:pathLst>
+          </a:custGeom>
+        </p:spPr>
+      </p:sp>
+      <p:sp>
+        <p:nvSpPr>
+          <p:cNvPr id="190" name="Google Shape;190;g7d8fae7b61_0_145:notes"/>
+          <p:cNvSpPr txBox="1">
+            <a:spLocks noGrp="1"/>
+          </p:cNvSpPr>
+          <p:nvPr>
+            <p:ph type="body" idx="1"/>
+          </p:nvPr>
+        </p:nvSpPr>
+        <p:spPr>
+          <a:xfrm>
+            <a:off x="685800" y="4343400"/>
+            <a:ext cx="5486400" cy="4114800"/>
+          </a:xfrm>
+          <a:prstGeom prst="rect">
+            <a:avLst/>
+          </a:prstGeom>
+        </p:spPr>
+        <p:txBody>
+          <a:bodyPr spcFirstLastPara="1" wrap="square" lIns="91425" tIns="91425" rIns="91425" bIns="91425" anchor="t" anchorCtr="0">
+            <a:noAutofit/>
+          </a:bodyPr>
+          <a:lstStyle/>
+          <a:p>
+            <a:pPr marL="0" lvl="0" indent="0" algn="l" rtl="0">
+              <a:spcBef>
+                <a:spcPts val="0"/>
+              </a:spcBef>
+              <a:spcAft>
+                <a:spcPts val="0"/>
+              </a:spcAft>
+              <a:buNone/>
+            </a:pPr>
+            <a:endParaRPr dirty="0"/>
+          </a:p>
+        </p:txBody>
+      </p:sp>
+    </p:spTree>
+    <p:extLst>
+      <p:ext uri="{BB962C8B-B14F-4D97-AF65-F5344CB8AC3E}">
+        <p14:creationId xmlns:p14="http://schemas.microsoft.com/office/powerpoint/2010/main" val="298287404"/>
       </p:ext>
     </p:extLst>
   </p:cSld>
@@ -6935,25 +7155,7 @@
                 <a:cs typeface="Gothic A1"/>
                 <a:sym typeface="Gothic A1"/>
               </a:rPr>
-              <a:t>정리에 </a:t>
-            </a:r>
-            <a:r>
-              <a:rPr lang="ko-KR" altLang="en-US" sz="2400" b="1" dirty="0" err="1">
-                <a:latin typeface="맑은 고딕" panose="020B0503020000020004" pitchFamily="50" charset="-127"/>
-                <a:ea typeface="맑은 고딕" panose="020B0503020000020004" pitchFamily="50" charset="-127"/>
-                <a:cs typeface="Gothic A1"/>
-                <a:sym typeface="Gothic A1"/>
-              </a:rPr>
-              <a:t>신경쓰려고</a:t>
-            </a:r>
-            <a:r>
-              <a:rPr lang="ko-KR" altLang="en-US" sz="2400" b="1" dirty="0">
-                <a:latin typeface="맑은 고딕" panose="020B0503020000020004" pitchFamily="50" charset="-127"/>
-                <a:ea typeface="맑은 고딕" panose="020B0503020000020004" pitchFamily="50" charset="-127"/>
-                <a:cs typeface="Gothic A1"/>
-                <a:sym typeface="Gothic A1"/>
-              </a:rPr>
-              <a:t> 노력하는</a:t>
+              <a:t>필요한 것이 무엇인지 고민하는</a:t>
             </a:r>
             <a:endParaRPr lang="en-US" altLang="ko-KR" sz="2400" b="1" dirty="0">
               <a:latin typeface="맑은 고딕" panose="020B0503020000020004" pitchFamily="50" charset="-127"/>
@@ -6976,43 +7178,14 @@
               <a:buNone/>
             </a:pPr>
             <a:r>
-              <a:rPr lang="ko-KR" altLang="en-US" sz="2400" b="1" dirty="0" err="1">
-                <a:latin typeface="맑은 고딕" panose="020B0503020000020004" pitchFamily="50" charset="-127"/>
-                <a:ea typeface="맑은 고딕" panose="020B0503020000020004" pitchFamily="50" charset="-127"/>
-                <a:cs typeface="Gothic A1"/>
-                <a:sym typeface="Gothic A1"/>
-              </a:rPr>
-              <a:t>백엔드</a:t>
-            </a:r>
-            <a:r>
               <a:rPr lang="ko-KR" altLang="en-US" sz="2400" b="1" dirty="0">
                 <a:latin typeface="맑은 고딕" panose="020B0503020000020004" pitchFamily="50" charset="-127"/>
                 <a:ea typeface="맑은 고딕" panose="020B0503020000020004" pitchFamily="50" charset="-127"/>
                 <a:cs typeface="Gothic A1"/>
                 <a:sym typeface="Gothic A1"/>
               </a:rPr>
-              <a:t> 엔지니어</a:t>
+              <a:t>엔지니어</a:t>
             </a:r>
-            <a:endParaRPr lang="en-US" altLang="ko-KR" sz="2400" b="1" dirty="0">
-              <a:latin typeface="맑은 고딕" panose="020B0503020000020004" pitchFamily="50" charset="-127"/>
-              <a:ea typeface="맑은 고딕" panose="020B0503020000020004" pitchFamily="50" charset="-127"/>
-              <a:cs typeface="Gothic A1"/>
-              <a:sym typeface="Gothic A1"/>
-            </a:endParaRPr>
-          </a:p>
-          <a:p>
-            <a:pPr marL="0" lvl="0" indent="0" algn="l" rtl="0">
-              <a:lnSpc>
-                <a:spcPct val="115000"/>
-              </a:lnSpc>
-              <a:spcBef>
-                <a:spcPts val="0"/>
-              </a:spcBef>
-              <a:spcAft>
-                <a:spcPts val="0"/>
-              </a:spcAft>
-              <a:buNone/>
-            </a:pPr>
             <a:endParaRPr sz="2400" b="1" dirty="0">
               <a:latin typeface="Gothic A1"/>
               <a:ea typeface="Gothic A1"/>
@@ -7688,7 +7861,7 @@
         </p:nvSpPr>
         <p:spPr>
           <a:xfrm>
-            <a:off x="2121437" y="3141050"/>
+            <a:off x="2121437" y="3323930"/>
             <a:ext cx="900000" cy="232200"/>
           </a:xfrm>
           <a:prstGeom prst="rect">
@@ -8243,7 +8416,7 @@
         </p:nvSpPr>
         <p:spPr>
           <a:xfrm>
-            <a:off x="2121437" y="3798987"/>
+            <a:off x="2121437" y="3981867"/>
             <a:ext cx="900000" cy="234000"/>
           </a:xfrm>
           <a:prstGeom prst="rect">
@@ -8806,7 +8979,7 @@
         </p:nvSpPr>
         <p:spPr>
           <a:xfrm>
-            <a:off x="3110844" y="3147687"/>
+            <a:off x="3110844" y="3330567"/>
             <a:ext cx="406799" cy="234000"/>
           </a:xfrm>
           <a:prstGeom prst="rect">
@@ -9092,7 +9265,7 @@
         </p:nvSpPr>
         <p:spPr>
           <a:xfrm>
-            <a:off x="3115389" y="2862973"/>
+            <a:off x="3118460" y="2848618"/>
             <a:ext cx="406799" cy="234000"/>
           </a:xfrm>
           <a:prstGeom prst="rect">
@@ -9356,7 +9529,7 @@
                 <a:cs typeface="Gothic A1"/>
                 <a:sym typeface="Gothic A1"/>
               </a:rPr>
-              <a:t>하</a:t>
+              <a:t>중</a:t>
             </a:r>
             <a:endParaRPr sz="1200" dirty="0">
               <a:latin typeface="맑은 고딕" panose="020B0503020000020004" pitchFamily="50" charset="-127"/>
@@ -9381,7 +9554,7 @@
         </p:nvSpPr>
         <p:spPr>
           <a:xfrm>
-            <a:off x="3110845" y="3804616"/>
+            <a:off x="3110845" y="3987496"/>
             <a:ext cx="406799" cy="234000"/>
           </a:xfrm>
           <a:prstGeom prst="rect">
@@ -9949,7 +10122,7 @@
         </p:nvSpPr>
         <p:spPr>
           <a:xfrm>
-            <a:off x="2159486" y="5111765"/>
+            <a:off x="2159486" y="5264165"/>
             <a:ext cx="1761600" cy="232200"/>
           </a:xfrm>
           <a:prstGeom prst="rect">
@@ -10843,8 +11016,8 @@
         </p:nvSpPr>
         <p:spPr>
           <a:xfrm>
-            <a:off x="2121438" y="6448610"/>
-            <a:ext cx="5078400" cy="1255248"/>
+            <a:off x="2121438" y="6448609"/>
+            <a:ext cx="5078400" cy="1477521"/>
           </a:xfrm>
           <a:prstGeom prst="rect">
             <a:avLst/>
@@ -11101,8 +11274,22 @@
                 <a:latin typeface="+mn-ea"/>
                 <a:ea typeface="+mn-ea"/>
               </a:rPr>
-              <a:t>회사 홈페이지</a:t>
+              <a:t>기존 서비스 유지 보수 및 운영</a:t>
             </a:r>
+            <a:endParaRPr lang="en-US" altLang="ko-KR" sz="1100" b="0" i="0" dirty="0">
+              <a:solidFill>
+                <a:srgbClr val="374151"/>
+              </a:solidFill>
+              <a:effectLst/>
+              <a:latin typeface="+mn-ea"/>
+              <a:ea typeface="+mn-ea"/>
+            </a:endParaRPr>
+          </a:p>
+          <a:p>
+            <a:pPr marL="171450" indent="-171450" algn="l">
+              <a:buFontTx/>
+              <a:buChar char="-"/>
+            </a:pPr>
             <a:r>
               <a:rPr lang="en-US" altLang="ko-KR" sz="1100" b="0" i="0" dirty="0">
                 <a:solidFill>
@@ -11112,7 +11299,7 @@
                 <a:latin typeface="+mn-ea"/>
                 <a:ea typeface="+mn-ea"/>
               </a:rPr>
-              <a:t>(www.payprotocol.io)</a:t>
+              <a:t>ISMS </a:t>
             </a:r>
             <a:r>
               <a:rPr lang="ko-KR" altLang="en-US" sz="1100" b="0" i="0" dirty="0">
@@ -11123,7 +11310,7 @@
                 <a:latin typeface="+mn-ea"/>
                 <a:ea typeface="+mn-ea"/>
               </a:rPr>
-              <a:t> 관리를 포함한 정적 소스 관리</a:t>
+              <a:t>취약점 조치</a:t>
             </a:r>
             <a:endParaRPr lang="en-US" altLang="ko-KR" sz="1100" b="0" i="0" dirty="0">
               <a:solidFill>
@@ -11148,7 +11335,7 @@
                 <a:latin typeface="+mn-ea"/>
                 <a:ea typeface="+mn-ea"/>
               </a:rPr>
-              <a:t>통합 계정 관리 솔루션</a:t>
+              <a:t>신규 서비스 개발</a:t>
             </a:r>
             <a:r>
               <a:rPr lang="en-US" altLang="ko-KR" sz="1100" b="0" i="0" dirty="0">
@@ -11159,10 +11346,16 @@
                 <a:latin typeface="+mn-ea"/>
                 <a:ea typeface="+mn-ea"/>
               </a:rPr>
-              <a:t>(</a:t>
+              <a:t>(carecenter.payprotocol.io)</a:t>
             </a:r>
+          </a:p>
+          <a:p>
+            <a:pPr marL="171450" indent="-171450" algn="l">
+              <a:buFontTx/>
+              <a:buChar char="-"/>
+            </a:pPr>
             <a:r>
-              <a:rPr lang="en-US" altLang="ko-KR" sz="1100" b="0" i="0" dirty="0" err="1">
+              <a:rPr lang="ko-KR" altLang="en-US" sz="1100" b="0" i="0" dirty="0">
                 <a:solidFill>
                   <a:srgbClr val="374151"/>
                 </a:solidFill>
@@ -11170,51 +11363,7 @@
                 <a:latin typeface="+mn-ea"/>
                 <a:ea typeface="+mn-ea"/>
               </a:rPr>
-              <a:t>keycloak</a:t>
-            </a:r>
-            <a:r>
-              <a:rPr lang="en-US" altLang="ko-KR" sz="1100" b="0" i="0" dirty="0">
-                <a:solidFill>
-                  <a:srgbClr val="374151"/>
-                </a:solidFill>
-                <a:effectLst/>
-                <a:latin typeface="+mn-ea"/>
-                <a:ea typeface="+mn-ea"/>
-              </a:rPr>
-              <a:t>, </a:t>
-            </a:r>
-            <a:r>
-              <a:rPr lang="en-US" altLang="ko-KR" sz="1100" b="0" i="0" dirty="0" err="1">
-                <a:solidFill>
-                  <a:srgbClr val="374151"/>
-                </a:solidFill>
-                <a:effectLst/>
-                <a:latin typeface="+mn-ea"/>
-                <a:ea typeface="+mn-ea"/>
-              </a:rPr>
-              <a:t>casbin</a:t>
-            </a:r>
-            <a:r>
-              <a:rPr lang="en-US" altLang="ko-KR" sz="1100" b="0" i="0" dirty="0">
-                <a:solidFill>
-                  <a:srgbClr val="374151"/>
-                </a:solidFill>
-                <a:effectLst/>
-                <a:latin typeface="+mn-ea"/>
-                <a:ea typeface="+mn-ea"/>
-              </a:rPr>
-              <a:t>) </a:t>
-            </a:r>
-            <a:r>
-              <a:rPr lang="ko-KR" altLang="en-US" sz="1100" b="0" i="0" dirty="0">
-                <a:solidFill>
-                  <a:srgbClr val="374151"/>
-                </a:solidFill>
-                <a:effectLst/>
-                <a:latin typeface="+mn-ea"/>
-                <a:ea typeface="+mn-ea"/>
-              </a:rPr>
-              <a:t>검토 및 데모 개발</a:t>
+              <a:t>웹 서버 교체</a:t>
             </a:r>
             <a:endParaRPr lang="en-US" altLang="ko-KR" sz="1100" b="0" i="0" dirty="0">
               <a:solidFill>
@@ -11239,51 +11388,7 @@
                 <a:latin typeface="+mn-ea"/>
                 <a:ea typeface="+mn-ea"/>
               </a:rPr>
-              <a:t>웹서버 </a:t>
-            </a:r>
-            <a:r>
-              <a:rPr lang="en-US" altLang="ko-KR" sz="1100" b="0" i="0" dirty="0" err="1">
-                <a:solidFill>
-                  <a:srgbClr val="374151"/>
-                </a:solidFill>
-                <a:effectLst/>
-                <a:latin typeface="+mn-ea"/>
-                <a:ea typeface="+mn-ea"/>
-              </a:rPr>
-              <a:t>apache</a:t>
-            </a:r>
-            <a:r>
-              <a:rPr lang="ko-KR" altLang="en-US" sz="1100" b="0" i="0" dirty="0">
-                <a:solidFill>
-                  <a:srgbClr val="374151"/>
-                </a:solidFill>
-                <a:effectLst/>
-                <a:latin typeface="+mn-ea"/>
-                <a:ea typeface="+mn-ea"/>
-              </a:rPr>
-              <a:t>에서 </a:t>
-            </a:r>
-            <a:r>
-              <a:rPr lang="en-US" altLang="ko-KR" sz="1100" b="0" i="0" dirty="0">
-                <a:solidFill>
-                  <a:srgbClr val="374151"/>
-                </a:solidFill>
-                <a:effectLst/>
-                <a:latin typeface="+mn-ea"/>
-                <a:ea typeface="+mn-ea"/>
-              </a:rPr>
-              <a:t>nginx</a:t>
-            </a:r>
-            <a:r>
-              <a:rPr lang="ko-KR" altLang="en-US" sz="1100" b="0" i="0" dirty="0">
-                <a:solidFill>
-                  <a:srgbClr val="374151"/>
-                </a:solidFill>
-                <a:effectLst/>
-                <a:latin typeface="+mn-ea"/>
-                <a:ea typeface="+mn-ea"/>
-              </a:rPr>
-              <a:t>로 교체</a:t>
+              <a:t>자사 앱 리뷰 구글 스프레드 시트 개발</a:t>
             </a:r>
             <a:endParaRPr lang="en-US" altLang="ko-KR" sz="1100" b="0" i="0" dirty="0">
               <a:solidFill>
@@ -11308,40 +11413,19 @@
                 <a:latin typeface="+mn-ea"/>
                 <a:ea typeface="+mn-ea"/>
               </a:rPr>
-              <a:t>자사 앱 리뷰 </a:t>
+              <a:t>통합 계정 솔루션 조사 및 데모 구현</a:t>
             </a:r>
-            <a:r>
-              <a:rPr lang="ko-KR" altLang="en-US" sz="1100" b="0" i="0" dirty="0" err="1">
-                <a:solidFill>
-                  <a:srgbClr val="374151"/>
-                </a:solidFill>
-                <a:effectLst/>
-                <a:latin typeface="+mn-ea"/>
-                <a:ea typeface="+mn-ea"/>
-              </a:rPr>
-              <a:t>크롤링</a:t>
-            </a:r>
-            <a:r>
-              <a:rPr lang="ko-KR" altLang="en-US" sz="1100" b="0" i="0" dirty="0">
-                <a:solidFill>
-                  <a:srgbClr val="374151"/>
-                </a:solidFill>
-                <a:effectLst/>
-                <a:latin typeface="+mn-ea"/>
-                <a:ea typeface="+mn-ea"/>
-              </a:rPr>
-              <a:t> 및 공유용 구글 스프레드 시트 개발</a:t>
-            </a:r>
-            <a:endParaRPr lang="en-US" altLang="ko-KR" sz="1100" dirty="0">
+            <a:endParaRPr lang="en-US" altLang="ko-KR" sz="1100" b="0" i="0" dirty="0">
               <a:solidFill>
                 <a:srgbClr val="374151"/>
               </a:solidFill>
+              <a:effectLst/>
               <a:latin typeface="+mn-ea"/>
               <a:ea typeface="+mn-ea"/>
             </a:endParaRPr>
           </a:p>
           <a:p>
-            <a:pPr marL="171450" indent="-171450">
+            <a:pPr marL="171450" indent="-171450" algn="l">
               <a:buFontTx/>
               <a:buChar char="-"/>
             </a:pPr>
@@ -11354,7 +11438,7 @@
                 <a:latin typeface="+mn-ea"/>
                 <a:ea typeface="+mn-ea"/>
               </a:rPr>
-              <a:t>ISMS </a:t>
+              <a:t>elk stack </a:t>
             </a:r>
             <a:r>
               <a:rPr lang="ko-KR" altLang="en-US" sz="1100" b="0" i="0" dirty="0">
@@ -11365,10 +11449,24 @@
                 <a:latin typeface="+mn-ea"/>
                 <a:ea typeface="+mn-ea"/>
               </a:rPr>
-              <a:t>보안 조치</a:t>
+              <a:t>관리</a:t>
             </a:r>
+            <a:endParaRPr lang="en-US" altLang="ko-KR" sz="1100" b="0" i="0" dirty="0">
+              <a:solidFill>
+                <a:srgbClr val="374151"/>
+              </a:solidFill>
+              <a:effectLst/>
+              <a:latin typeface="+mn-ea"/>
+              <a:ea typeface="+mn-ea"/>
+            </a:endParaRPr>
+          </a:p>
+          <a:p>
+            <a:pPr marL="171450" indent="-171450" algn="l">
+              <a:buFontTx/>
+              <a:buChar char="-"/>
+            </a:pPr>
             <a:r>
-              <a:rPr lang="en-US" altLang="ko-KR" sz="1100" b="0" i="0" dirty="0">
+              <a:rPr lang="en-US" altLang="ko-KR" sz="1100" b="0" i="0" dirty="0" err="1">
                 <a:solidFill>
                   <a:srgbClr val="374151"/>
                 </a:solidFill>
@@ -11376,10 +11474,10 @@
                 <a:latin typeface="+mn-ea"/>
                 <a:ea typeface="+mn-ea"/>
               </a:rPr>
-              <a:t>(docker, </a:t>
+              <a:t>atlassian</a:t>
             </a:r>
             <a:r>
-              <a:rPr lang="en-US" altLang="ko-KR" sz="1100" b="0" i="0" dirty="0" err="1">
+              <a:rPr lang="en-US" altLang="ko-KR" sz="1100" b="0" i="0" dirty="0">
                 <a:solidFill>
                   <a:srgbClr val="374151"/>
                 </a:solidFill>
@@ -11387,10 +11485,10 @@
                 <a:latin typeface="+mn-ea"/>
                 <a:ea typeface="+mn-ea"/>
               </a:rPr>
-              <a:t>apache</a:t>
+              <a:t> tool </a:t>
             </a:r>
             <a:r>
-              <a:rPr lang="en-US" altLang="ko-KR" sz="1100" b="0" i="0" dirty="0">
+              <a:rPr lang="ko-KR" altLang="en-US" sz="1100" b="0" i="0" dirty="0">
                 <a:solidFill>
                   <a:srgbClr val="374151"/>
                 </a:solidFill>
@@ -11398,10 +11496,10 @@
                 <a:latin typeface="+mn-ea"/>
                 <a:ea typeface="+mn-ea"/>
               </a:rPr>
-              <a:t>, </a:t>
+              <a:t>관리</a:t>
             </a:r>
             <a:r>
-              <a:rPr lang="en-US" altLang="ko-KR" sz="1100" b="0" i="0" dirty="0" err="1">
+              <a:rPr lang="en-US" altLang="ko-KR" sz="1100" b="0" i="0" dirty="0">
                 <a:solidFill>
                   <a:srgbClr val="374151"/>
                 </a:solidFill>
@@ -11409,10 +11507,10 @@
                 <a:latin typeface="+mn-ea"/>
                 <a:ea typeface="+mn-ea"/>
               </a:rPr>
-              <a:t>redis</a:t>
+              <a:t>(confluence, </a:t>
             </a:r>
             <a:r>
-              <a:rPr lang="en-US" altLang="ko-KR" sz="1100" b="0" i="0" dirty="0">
+              <a:rPr lang="en-US" altLang="ko-KR" sz="1100" b="0" i="0" dirty="0" err="1">
                 <a:solidFill>
                   <a:srgbClr val="374151"/>
                 </a:solidFill>
@@ -11420,18 +11518,7 @@
                 <a:latin typeface="+mn-ea"/>
                 <a:ea typeface="+mn-ea"/>
               </a:rPr>
-              <a:t> </a:t>
-            </a:r>
-            <a:r>
-              <a:rPr lang="ko-KR" altLang="en-US" sz="1100" b="0" i="0" dirty="0">
-                <a:solidFill>
-                  <a:srgbClr val="374151"/>
-                </a:solidFill>
-                <a:effectLst/>
-                <a:latin typeface="+mn-ea"/>
-                <a:ea typeface="+mn-ea"/>
-              </a:rPr>
-              <a:t>등</a:t>
+              <a:t>jira</a:t>
             </a:r>
             <a:r>
               <a:rPr lang="en-US" altLang="ko-KR" sz="1100" b="0" i="0" dirty="0">
@@ -11446,7 +11533,7 @@
             </a:r>
           </a:p>
           <a:p>
-            <a:pPr marL="171450" indent="-171450">
+            <a:pPr marL="171450" indent="-171450" algn="l">
               <a:buFontTx/>
               <a:buChar char="-"/>
             </a:pPr>
@@ -11458,17 +11545,17 @@
                 <a:latin typeface="+mn-ea"/>
                 <a:ea typeface="+mn-ea"/>
               </a:rPr>
-              <a:t>앱에 쓰이는 </a:t>
+              <a:t>사내 </a:t>
             </a:r>
             <a:r>
-              <a:rPr lang="ko-KR" altLang="en-US" sz="1100" dirty="0" err="1">
+              <a:rPr lang="en-US" altLang="ko-KR" sz="1100" dirty="0">
                 <a:solidFill>
                   <a:srgbClr val="374151"/>
                 </a:solidFill>
                 <a:latin typeface="+mn-ea"/>
                 <a:ea typeface="+mn-ea"/>
               </a:rPr>
-              <a:t>웹뷰</a:t>
+              <a:t>registry(nexus) </a:t>
             </a:r>
             <a:r>
               <a:rPr lang="ko-KR" altLang="en-US" sz="1100" dirty="0">
@@ -11478,140 +11565,7 @@
                 <a:latin typeface="+mn-ea"/>
                 <a:ea typeface="+mn-ea"/>
               </a:rPr>
-              <a:t> 서버 운영 및 유지보수</a:t>
-            </a:r>
-            <a:r>
-              <a:rPr lang="en-US" altLang="ko-KR" sz="1100" dirty="0">
-                <a:solidFill>
-                  <a:srgbClr val="374151"/>
-                </a:solidFill>
-                <a:latin typeface="+mn-ea"/>
-                <a:ea typeface="+mn-ea"/>
-              </a:rPr>
-              <a:t>(</a:t>
-            </a:r>
-            <a:r>
-              <a:rPr lang="ko-KR" altLang="en-US" sz="1100" dirty="0">
-                <a:solidFill>
-                  <a:srgbClr val="374151"/>
-                </a:solidFill>
-                <a:latin typeface="+mn-ea"/>
-                <a:ea typeface="+mn-ea"/>
-              </a:rPr>
-              <a:t>로그 정책 변경</a:t>
-            </a:r>
-            <a:r>
-              <a:rPr lang="en-US" altLang="ko-KR" sz="1100" dirty="0">
-                <a:solidFill>
-                  <a:srgbClr val="374151"/>
-                </a:solidFill>
-                <a:latin typeface="+mn-ea"/>
-                <a:ea typeface="+mn-ea"/>
-              </a:rPr>
-              <a:t>, </a:t>
-            </a:r>
-            <a:r>
-              <a:rPr lang="ko-KR" altLang="en-US" sz="1100" dirty="0">
-                <a:solidFill>
-                  <a:srgbClr val="374151"/>
-                </a:solidFill>
-                <a:latin typeface="+mn-ea"/>
-                <a:ea typeface="+mn-ea"/>
-              </a:rPr>
-              <a:t>서버 의존성 제거 등</a:t>
-            </a:r>
-            <a:r>
-              <a:rPr lang="en-US" altLang="ko-KR" sz="1100" dirty="0">
-                <a:solidFill>
-                  <a:srgbClr val="374151"/>
-                </a:solidFill>
-                <a:latin typeface="+mn-ea"/>
-                <a:ea typeface="+mn-ea"/>
-              </a:rPr>
-              <a:t>)</a:t>
-            </a:r>
-          </a:p>
-          <a:p>
-            <a:pPr marL="171450" indent="-171450">
-              <a:buFontTx/>
-              <a:buChar char="-"/>
-            </a:pPr>
-            <a:r>
-              <a:rPr lang="ko-KR" altLang="en-US" sz="1100" b="0" i="0" dirty="0">
-                <a:solidFill>
-                  <a:srgbClr val="374151"/>
-                </a:solidFill>
-                <a:effectLst/>
-                <a:latin typeface="+mn-ea"/>
-                <a:ea typeface="+mn-ea"/>
-              </a:rPr>
-              <a:t>회사 내부 백오피스 개발 및 유지보수</a:t>
-            </a:r>
-            <a:r>
-              <a:rPr lang="en-US" altLang="ko-KR" sz="1100" b="0" i="0" dirty="0">
-                <a:solidFill>
-                  <a:srgbClr val="374151"/>
-                </a:solidFill>
-                <a:effectLst/>
-                <a:latin typeface="+mn-ea"/>
-                <a:ea typeface="+mn-ea"/>
-              </a:rPr>
-              <a:t>(</a:t>
-            </a:r>
-            <a:r>
-              <a:rPr lang="ko-KR" altLang="en-US" sz="1100" b="0" i="0" dirty="0">
-                <a:solidFill>
-                  <a:srgbClr val="374151"/>
-                </a:solidFill>
-                <a:effectLst/>
-                <a:latin typeface="+mn-ea"/>
-                <a:ea typeface="+mn-ea"/>
-              </a:rPr>
-              <a:t>버그 </a:t>
-            </a:r>
-            <a:r>
-              <a:rPr lang="ko-KR" altLang="en-US" sz="1100" b="0" i="0" dirty="0" err="1">
-                <a:solidFill>
-                  <a:srgbClr val="374151"/>
-                </a:solidFill>
-                <a:effectLst/>
-                <a:latin typeface="+mn-ea"/>
-                <a:ea typeface="+mn-ea"/>
-              </a:rPr>
-              <a:t>픽스</a:t>
-            </a:r>
-            <a:r>
-              <a:rPr lang="en-US" altLang="ko-KR" sz="1100" b="0" i="0" dirty="0">
-                <a:solidFill>
-                  <a:srgbClr val="374151"/>
-                </a:solidFill>
-                <a:effectLst/>
-                <a:latin typeface="+mn-ea"/>
-                <a:ea typeface="+mn-ea"/>
-              </a:rPr>
-              <a:t>, </a:t>
-            </a:r>
-            <a:r>
-              <a:rPr lang="ko-KR" altLang="en-US" sz="1100" b="0" i="0" dirty="0">
-                <a:solidFill>
-                  <a:srgbClr val="374151"/>
-                </a:solidFill>
-                <a:effectLst/>
-                <a:latin typeface="+mn-ea"/>
-                <a:ea typeface="+mn-ea"/>
-              </a:rPr>
-              <a:t>신규 관리 기능 추가 등</a:t>
-            </a:r>
-            <a:r>
-              <a:rPr lang="en-US" altLang="ko-KR" sz="1100" b="0" i="0" dirty="0">
-                <a:solidFill>
-                  <a:srgbClr val="374151"/>
-                </a:solidFill>
-                <a:effectLst/>
-                <a:latin typeface="+mn-ea"/>
-                <a:ea typeface="+mn-ea"/>
-              </a:rPr>
-              <a:t>)</a:t>
+              <a:t>구축 및 관리</a:t>
             </a:r>
             <a:endParaRPr lang="ko-KR" altLang="en-US" sz="1100" b="0" i="0" dirty="0">
               <a:solidFill>
@@ -11954,7 +11908,7 @@
         </p:nvSpPr>
         <p:spPr>
           <a:xfrm>
-            <a:off x="2140637" y="7721550"/>
+            <a:off x="2140637" y="7995870"/>
             <a:ext cx="5078400" cy="232200"/>
           </a:xfrm>
           <a:prstGeom prst="rect">
@@ -12214,7 +12168,7 @@
                 <a:cs typeface="Gothic A1"/>
                 <a:sym typeface="Gothic A1"/>
               </a:rPr>
-              <a:t>#vue #</a:t>
+              <a:t>#</a:t>
             </a:r>
             <a:r>
               <a:rPr lang="en-US" sz="1000" dirty="0">
@@ -12226,7 +12180,79 @@
                 <a:cs typeface="Gothic A1"/>
                 <a:sym typeface="Gothic A1"/>
               </a:rPr>
-              <a:t>nginx #html #docker #redis #flask</a:t>
+              <a:t>nginx #docker #redis #flask #express</a:t>
+            </a:r>
+            <a:r>
+              <a:rPr lang="ko-KR" altLang="en-US" sz="1000" dirty="0">
+                <a:solidFill>
+                  <a:srgbClr val="4A86E8"/>
+                </a:solidFill>
+                <a:latin typeface="맑은 고딕" panose="020B0503020000020004" pitchFamily="50" charset="-127"/>
+                <a:ea typeface="맑은 고딕" panose="020B0503020000020004" pitchFamily="50" charset="-127"/>
+                <a:cs typeface="Gothic A1"/>
+                <a:sym typeface="Gothic A1"/>
+              </a:rPr>
+              <a:t> </a:t>
+            </a:r>
+            <a:r>
+              <a:rPr lang="en-US" altLang="ko-KR" sz="1000" dirty="0">
+                <a:solidFill>
+                  <a:srgbClr val="4A86E8"/>
+                </a:solidFill>
+                <a:latin typeface="맑은 고딕" panose="020B0503020000020004" pitchFamily="50" charset="-127"/>
+                <a:ea typeface="맑은 고딕" panose="020B0503020000020004" pitchFamily="50" charset="-127"/>
+                <a:cs typeface="Gothic A1"/>
+                <a:sym typeface="Gothic A1"/>
+              </a:rPr>
+              <a:t>#typescript</a:t>
+            </a:r>
+            <a:r>
+              <a:rPr lang="ko-KR" altLang="en-US" sz="1000" dirty="0">
+                <a:solidFill>
+                  <a:srgbClr val="4A86E8"/>
+                </a:solidFill>
+                <a:latin typeface="맑은 고딕" panose="020B0503020000020004" pitchFamily="50" charset="-127"/>
+                <a:ea typeface="맑은 고딕" panose="020B0503020000020004" pitchFamily="50" charset="-127"/>
+                <a:cs typeface="Gothic A1"/>
+                <a:sym typeface="Gothic A1"/>
+              </a:rPr>
+              <a:t> </a:t>
+            </a:r>
+            <a:r>
+              <a:rPr lang="en-US" altLang="ko-KR" sz="1000" dirty="0">
+                <a:solidFill>
+                  <a:srgbClr val="4A86E8"/>
+                </a:solidFill>
+                <a:latin typeface="맑은 고딕" panose="020B0503020000020004" pitchFamily="50" charset="-127"/>
+                <a:ea typeface="맑은 고딕" panose="020B0503020000020004" pitchFamily="50" charset="-127"/>
+                <a:cs typeface="Gothic A1"/>
+                <a:sym typeface="Gothic A1"/>
+              </a:rPr>
+              <a:t>#linux</a:t>
+            </a:r>
+            <a:r>
+              <a:rPr lang="ko-KR" altLang="en-US" sz="1000" dirty="0">
+                <a:solidFill>
+                  <a:srgbClr val="4A86E8"/>
+                </a:solidFill>
+                <a:latin typeface="맑은 고딕" panose="020B0503020000020004" pitchFamily="50" charset="-127"/>
+                <a:ea typeface="맑은 고딕" panose="020B0503020000020004" pitchFamily="50" charset="-127"/>
+                <a:cs typeface="Gothic A1"/>
+                <a:sym typeface="Gothic A1"/>
+              </a:rPr>
+              <a:t> </a:t>
+            </a:r>
+            <a:r>
+              <a:rPr lang="en-US" altLang="ko-KR" sz="1000" dirty="0">
+                <a:solidFill>
+                  <a:srgbClr val="4A86E8"/>
+                </a:solidFill>
+                <a:latin typeface="맑은 고딕" panose="020B0503020000020004" pitchFamily="50" charset="-127"/>
+                <a:ea typeface="맑은 고딕" panose="020B0503020000020004" pitchFamily="50" charset="-127"/>
+                <a:cs typeface="Gothic A1"/>
+                <a:sym typeface="Gothic A1"/>
+              </a:rPr>
+              <a:t>#elk</a:t>
             </a:r>
             <a:endParaRPr sz="1000" dirty="0">
               <a:solidFill>
@@ -12255,7 +12281,7 @@
         <p:spPr>
           <a:xfrm>
             <a:off x="3616158" y="2429419"/>
-            <a:ext cx="3389471" cy="234000"/>
+            <a:ext cx="3389471" cy="348856"/>
           </a:xfrm>
           <a:prstGeom prst="rect">
             <a:avLst/>
@@ -12551,8 +12577,8 @@
         </p:nvSpPr>
         <p:spPr>
           <a:xfrm>
-            <a:off x="3607050" y="3154122"/>
-            <a:ext cx="3389471" cy="234000"/>
+            <a:off x="3607050" y="3337002"/>
+            <a:ext cx="3389471" cy="570868"/>
           </a:xfrm>
           <a:prstGeom prst="rect">
             <a:avLst/>
@@ -12933,8 +12959,8 @@
         </p:nvSpPr>
         <p:spPr>
           <a:xfrm>
-            <a:off x="3613087" y="2885056"/>
-            <a:ext cx="3389471" cy="234000"/>
+            <a:off x="3613087" y="2885055"/>
+            <a:ext cx="3389471" cy="387937"/>
           </a:xfrm>
           <a:prstGeom prst="rect">
             <a:avLst/>
@@ -13194,6 +13220,44 @@
               <a:sym typeface="Gothic A1"/>
             </a:endParaRPr>
           </a:p>
+          <a:p>
+            <a:r>
+              <a:rPr lang="ko-KR" altLang="en-US" sz="1200" dirty="0">
+                <a:latin typeface="맑은 고딕" panose="020B0503020000020004" pitchFamily="50" charset="-127"/>
+                <a:ea typeface="맑은 고딕" panose="020B0503020000020004" pitchFamily="50" charset="-127"/>
+                <a:cs typeface="Gothic A1"/>
+                <a:sym typeface="Gothic A1"/>
+              </a:rPr>
+              <a:t>정적 타입 언어 사용법 경험</a:t>
+            </a:r>
+            <a:r>
+              <a:rPr lang="en-US" altLang="ko-KR" sz="1200" dirty="0">
+                <a:latin typeface="맑은 고딕" panose="020B0503020000020004" pitchFamily="50" charset="-127"/>
+                <a:ea typeface="맑은 고딕" panose="020B0503020000020004" pitchFamily="50" charset="-127"/>
+                <a:cs typeface="Gothic A1"/>
+                <a:sym typeface="Gothic A1"/>
+              </a:rPr>
+              <a:t>(</a:t>
+            </a:r>
+            <a:r>
+              <a:rPr lang="en-US" altLang="ko-KR" sz="1200" dirty="0" err="1">
+                <a:latin typeface="맑은 고딕" panose="020B0503020000020004" pitchFamily="50" charset="-127"/>
+                <a:ea typeface="맑은 고딕" panose="020B0503020000020004" pitchFamily="50" charset="-127"/>
+                <a:cs typeface="Gothic A1"/>
+                <a:sym typeface="Gothic A1"/>
+              </a:rPr>
+              <a:t>cargoAUuction</a:t>
+            </a:r>
+            <a:r>
+              <a:rPr lang="en-US" altLang="ko-KR" sz="1200" dirty="0">
+                <a:latin typeface="맑은 고딕" panose="020B0503020000020004" pitchFamily="50" charset="-127"/>
+                <a:ea typeface="맑은 고딕" panose="020B0503020000020004" pitchFamily="50" charset="-127"/>
+                <a:cs typeface="Gothic A1"/>
+                <a:sym typeface="Gothic A1"/>
+              </a:rPr>
+              <a:t>)</a:t>
+            </a:r>
+          </a:p>
         </p:txBody>
       </p:sp>
       <p:sp>
@@ -13210,8 +13274,8 @@
         </p:nvSpPr>
         <p:spPr>
           <a:xfrm>
-            <a:off x="3608543" y="3824571"/>
-            <a:ext cx="3389471" cy="212978"/>
+            <a:off x="3608543" y="4007451"/>
+            <a:ext cx="3389471" cy="385171"/>
           </a:xfrm>
           <a:prstGeom prst="rect">
             <a:avLst/>
@@ -13507,7 +13571,7 @@
         </p:nvGrpSpPr>
         <p:grpSpPr>
           <a:xfrm>
-            <a:off x="2123193" y="8093272"/>
+            <a:off x="2123193" y="8398072"/>
             <a:ext cx="5078399" cy="377368"/>
             <a:chOff x="2121225" y="2774111"/>
             <a:chExt cx="5078398" cy="377368"/>
@@ -14482,7 +14546,7 @@
         </p:nvSpPr>
         <p:spPr>
           <a:xfrm>
-            <a:off x="2109862" y="4196958"/>
+            <a:off x="2109862" y="4379838"/>
             <a:ext cx="900000" cy="234000"/>
           </a:xfrm>
           <a:prstGeom prst="rect">
@@ -14759,7 +14823,7 @@
         </p:nvSpPr>
         <p:spPr>
           <a:xfrm>
-            <a:off x="3099270" y="4202587"/>
+            <a:off x="3099270" y="4385467"/>
             <a:ext cx="406799" cy="234000"/>
           </a:xfrm>
           <a:prstGeom prst="rect">
@@ -15045,8 +15109,8 @@
         </p:nvSpPr>
         <p:spPr>
           <a:xfrm>
-            <a:off x="3596968" y="4222542"/>
-            <a:ext cx="3389471" cy="413074"/>
+            <a:off x="3596968" y="4405422"/>
+            <a:ext cx="3389471" cy="398333"/>
           </a:xfrm>
           <a:prstGeom prst="rect">
             <a:avLst/>
@@ -15357,7 +15421,7 @@
         </p:nvSpPr>
         <p:spPr>
           <a:xfrm>
-            <a:off x="2111787" y="4627152"/>
+            <a:off x="2111787" y="4810032"/>
             <a:ext cx="900000" cy="234000"/>
           </a:xfrm>
           <a:prstGeom prst="rect">
@@ -15634,7 +15698,7 @@
         </p:nvSpPr>
         <p:spPr>
           <a:xfrm>
-            <a:off x="3101195" y="4632781"/>
+            <a:off x="3101195" y="4815661"/>
             <a:ext cx="406799" cy="234000"/>
           </a:xfrm>
           <a:prstGeom prst="rect">
@@ -15920,7 +15984,7 @@
         </p:nvSpPr>
         <p:spPr>
           <a:xfrm>
-            <a:off x="3598893" y="4652735"/>
+            <a:off x="3596968" y="4849717"/>
             <a:ext cx="3389471" cy="426967"/>
           </a:xfrm>
           <a:prstGeom prst="rect">
@@ -16165,15 +16229,6 @@
             </a:lvl9pPr>
           </a:lstStyle>
           <a:p>
-            <a:r>
-              <a:rPr lang="en-US" altLang="ko-KR" sz="1200" dirty="0">
-                <a:latin typeface="맑은 고딕" panose="020B0503020000020004" pitchFamily="50" charset="-127"/>
-                <a:ea typeface="맑은 고딕" panose="020B0503020000020004" pitchFamily="50" charset="-127"/>
-                <a:cs typeface="Gothic A1"/>
-                <a:sym typeface="Gothic A1"/>
-              </a:rPr>
-              <a:t>R</a:t>
-            </a:r>
             <a:r>
               <a:rPr lang="ko-KR" altLang="en-US" sz="1200" dirty="0">
                 <a:latin typeface="맑은 고딕" panose="020B0503020000020004" pitchFamily="50" charset="-127"/>
@@ -16253,7 +16308,7 @@
         </p:nvGrpSpPr>
         <p:grpSpPr>
           <a:xfrm>
-            <a:off x="2136693" y="8616061"/>
+            <a:off x="2121453" y="8905621"/>
             <a:ext cx="5078399" cy="377368"/>
             <a:chOff x="2121225" y="2774111"/>
             <a:chExt cx="5078398" cy="377368"/>
@@ -17198,7 +17253,7 @@
         </p:nvSpPr>
         <p:spPr>
           <a:xfrm>
-            <a:off x="2155953" y="9669352"/>
+            <a:off x="2155953" y="10035112"/>
             <a:ext cx="648207" cy="222334"/>
           </a:xfrm>
           <a:prstGeom prst="rect">
@@ -17256,7 +17311,7 @@
         </p:nvSpPr>
         <p:spPr>
           <a:xfrm>
-            <a:off x="2159486" y="9145330"/>
+            <a:off x="2159486" y="9511090"/>
             <a:ext cx="5078400" cy="3600"/>
           </a:xfrm>
           <a:prstGeom prst="rect">
@@ -17324,7 +17379,7 @@
         </p:nvSpPr>
         <p:spPr>
           <a:xfrm>
-            <a:off x="3201788" y="9668963"/>
+            <a:off x="3201788" y="10034723"/>
             <a:ext cx="3866700" cy="255420"/>
           </a:xfrm>
           <a:prstGeom prst="rect">
@@ -17375,7 +17430,7 @@
         </p:nvSpPr>
         <p:spPr>
           <a:xfrm>
-            <a:off x="2121438" y="9323141"/>
+            <a:off x="2121438" y="9688901"/>
             <a:ext cx="1761600" cy="232200"/>
           </a:xfrm>
           <a:prstGeom prst="rect">
@@ -17670,7 +17725,7 @@
         </p:nvSpPr>
         <p:spPr>
           <a:xfrm>
-            <a:off x="2157884" y="9925926"/>
+            <a:off x="2157884" y="10291686"/>
             <a:ext cx="648207" cy="222334"/>
           </a:xfrm>
           <a:prstGeom prst="rect">
@@ -17728,7 +17783,7 @@
         </p:nvSpPr>
         <p:spPr>
           <a:xfrm>
-            <a:off x="3203719" y="9925537"/>
+            <a:off x="3203719" y="10291297"/>
             <a:ext cx="3866700" cy="255420"/>
           </a:xfrm>
           <a:prstGeom prst="rect">
@@ -20417,6 +20472,1626 @@
 </p:sld>
 </file>
 
+<file path=ppt/slides/slide5.xml><?xml version="1.0" encoding="utf-8"?>
+<p:sld xmlns:a="http://schemas.openxmlformats.org/drawingml/2006/main" xmlns:r="http://schemas.openxmlformats.org/officeDocument/2006/relationships" xmlns:p="http://schemas.openxmlformats.org/presentationml/2006/main">
+  <p:cSld>
+    <p:spTree>
+      <p:nvGrpSpPr>
+        <p:cNvPr id="1" name="Shape 174"/>
+        <p:cNvGrpSpPr/>
+        <p:nvPr/>
+      </p:nvGrpSpPr>
+      <p:grpSpPr>
+        <a:xfrm>
+          <a:off x="0" y="0"/>
+          <a:ext cx="0" cy="0"/>
+          <a:chOff x="0" y="0"/>
+          <a:chExt cx="0" cy="0"/>
+        </a:xfrm>
+      </p:grpSpPr>
+      <p:sp>
+        <p:nvSpPr>
+          <p:cNvPr id="175" name="Google Shape;175;p20"/>
+          <p:cNvSpPr/>
+          <p:nvPr/>
+        </p:nvSpPr>
+        <p:spPr>
+          <a:xfrm>
+            <a:off x="50" y="25"/>
+            <a:ext cx="7560000" cy="10692000"/>
+          </a:xfrm>
+          <a:prstGeom prst="rect">
+            <a:avLst/>
+          </a:prstGeom>
+          <a:solidFill>
+            <a:srgbClr val="262626"/>
+          </a:solidFill>
+          <a:ln>
+            <a:noFill/>
+          </a:ln>
+        </p:spPr>
+        <p:txBody>
+          <a:bodyPr spcFirstLastPara="1" wrap="square" lIns="91425" tIns="91425" rIns="91425" bIns="91425" anchor="ctr" anchorCtr="0">
+            <a:noAutofit/>
+          </a:bodyPr>
+          <a:lstStyle/>
+          <a:p>
+            <a:pPr marL="0" lvl="0" indent="0" algn="l" rtl="0">
+              <a:spcBef>
+                <a:spcPts val="0"/>
+              </a:spcBef>
+              <a:spcAft>
+                <a:spcPts val="0"/>
+              </a:spcAft>
+              <a:buNone/>
+            </a:pPr>
+            <a:endParaRPr dirty="0">
+              <a:latin typeface="맑은 고딕" panose="020B0503020000020004" pitchFamily="50" charset="-127"/>
+            </a:endParaRPr>
+          </a:p>
+        </p:txBody>
+      </p:sp>
+      <p:sp>
+        <p:nvSpPr>
+          <p:cNvPr id="176" name="Google Shape;176;p20"/>
+          <p:cNvSpPr/>
+          <p:nvPr/>
+        </p:nvSpPr>
+        <p:spPr>
+          <a:xfrm>
+            <a:off x="50" y="9207425"/>
+            <a:ext cx="7560000" cy="1484700"/>
+          </a:xfrm>
+          <a:prstGeom prst="rect">
+            <a:avLst/>
+          </a:prstGeom>
+          <a:solidFill>
+            <a:srgbClr val="666666"/>
+          </a:solidFill>
+          <a:ln>
+            <a:noFill/>
+          </a:ln>
+        </p:spPr>
+        <p:txBody>
+          <a:bodyPr spcFirstLastPara="1" wrap="square" lIns="91425" tIns="91425" rIns="91425" bIns="91425" anchor="ctr" anchorCtr="0">
+            <a:noAutofit/>
+          </a:bodyPr>
+          <a:lstStyle/>
+          <a:p>
+            <a:pPr marL="0" lvl="0" indent="0" algn="l" rtl="0">
+              <a:spcBef>
+                <a:spcPts val="0"/>
+              </a:spcBef>
+              <a:spcAft>
+                <a:spcPts val="0"/>
+              </a:spcAft>
+              <a:buNone/>
+            </a:pPr>
+            <a:endParaRPr dirty="0">
+              <a:latin typeface="맑은 고딕" panose="020B0503020000020004" pitchFamily="50" charset="-127"/>
+            </a:endParaRPr>
+          </a:p>
+        </p:txBody>
+      </p:sp>
+      <p:sp>
+        <p:nvSpPr>
+          <p:cNvPr id="177" name="Google Shape;177;p20"/>
+          <p:cNvSpPr txBox="1"/>
+          <p:nvPr/>
+        </p:nvSpPr>
+        <p:spPr>
+          <a:xfrm>
+            <a:off x="2123777" y="7652152"/>
+            <a:ext cx="4699500" cy="554300"/>
+          </a:xfrm>
+          <a:prstGeom prst="rect">
+            <a:avLst/>
+          </a:prstGeom>
+          <a:noFill/>
+          <a:ln>
+            <a:noFill/>
+          </a:ln>
+        </p:spPr>
+        <p:txBody>
+          <a:bodyPr spcFirstLastPara="1" wrap="square" lIns="91425" tIns="91425" rIns="91425" bIns="91425" anchor="t" anchorCtr="0">
+            <a:noAutofit/>
+          </a:bodyPr>
+          <a:lstStyle/>
+          <a:p>
+            <a:r>
+              <a:rPr lang="en-US" altLang="ko-KR" sz="2800" dirty="0" err="1">
+                <a:solidFill>
+                  <a:srgbClr val="FFFFFF"/>
+                </a:solidFill>
+                <a:latin typeface="맑은 고딕" panose="020B0503020000020004" pitchFamily="50" charset="-127"/>
+                <a:ea typeface="맑은 고딕" panose="020B0503020000020004" pitchFamily="50" charset="-127"/>
+                <a:cs typeface="Gothic A1 ExtraBold"/>
+                <a:sym typeface="Gothic A1 ExtraBold"/>
+              </a:rPr>
+              <a:t>Cargo_auction</a:t>
+            </a:r>
+            <a:endParaRPr lang="en-US" altLang="ko-KR" sz="2800" dirty="0">
+              <a:solidFill>
+                <a:srgbClr val="FFFFFF"/>
+              </a:solidFill>
+              <a:latin typeface="맑은 고딕" panose="020B0503020000020004" pitchFamily="50" charset="-127"/>
+              <a:ea typeface="맑은 고딕" panose="020B0503020000020004" pitchFamily="50" charset="-127"/>
+              <a:cs typeface="Gothic A1 ExtraBold"/>
+              <a:sym typeface="Gothic A1 ExtraBold"/>
+            </a:endParaRPr>
+          </a:p>
+        </p:txBody>
+      </p:sp>
+      <p:sp>
+        <p:nvSpPr>
+          <p:cNvPr id="178" name="Google Shape;178;p20"/>
+          <p:cNvSpPr txBox="1"/>
+          <p:nvPr/>
+        </p:nvSpPr>
+        <p:spPr>
+          <a:xfrm>
+            <a:off x="580935" y="9680446"/>
+            <a:ext cx="5920800" cy="347700"/>
+          </a:xfrm>
+          <a:prstGeom prst="rect">
+            <a:avLst/>
+          </a:prstGeom>
+          <a:noFill/>
+          <a:ln>
+            <a:noFill/>
+          </a:ln>
+        </p:spPr>
+        <p:txBody>
+          <a:bodyPr spcFirstLastPara="1" wrap="square" lIns="91425" tIns="91425" rIns="91425" bIns="91425" anchor="t" anchorCtr="0">
+            <a:noAutofit/>
+          </a:bodyPr>
+          <a:lstStyle/>
+          <a:p>
+            <a:pPr marL="0" lvl="0" indent="0" algn="l" rtl="0">
+              <a:spcBef>
+                <a:spcPts val="0"/>
+              </a:spcBef>
+              <a:spcAft>
+                <a:spcPts val="0"/>
+              </a:spcAft>
+              <a:buNone/>
+            </a:pPr>
+            <a:r>
+              <a:rPr lang="en" sz="1200" dirty="0">
+                <a:solidFill>
+                  <a:srgbClr val="FFFFFF"/>
+                </a:solidFill>
+                <a:latin typeface="맑은 고딕" panose="020B0503020000020004" pitchFamily="50" charset="-127"/>
+                <a:ea typeface="맑은 고딕" panose="020B0503020000020004" pitchFamily="50" charset="-127"/>
+                <a:cs typeface="Gothic A1 ExtraBold"/>
+                <a:sym typeface="Gothic A1 ExtraBold"/>
+              </a:rPr>
+              <a:t>프로젝트 기간 : 2023.01 – </a:t>
+            </a:r>
+            <a:r>
+              <a:rPr lang="ko-KR" altLang="en-US" sz="1200" dirty="0">
+                <a:solidFill>
+                  <a:srgbClr val="FFFFFF"/>
+                </a:solidFill>
+                <a:latin typeface="맑은 고딕" panose="020B0503020000020004" pitchFamily="50" charset="-127"/>
+                <a:ea typeface="맑은 고딕" panose="020B0503020000020004" pitchFamily="50" charset="-127"/>
+                <a:cs typeface="Gothic A1 ExtraBold"/>
+                <a:sym typeface="Gothic A1 ExtraBold"/>
+              </a:rPr>
+              <a:t>현재</a:t>
+            </a:r>
+            <a:r>
+              <a:rPr lang="en-US" altLang="ko-KR" sz="1200" dirty="0">
+                <a:solidFill>
+                  <a:srgbClr val="FFFFFF"/>
+                </a:solidFill>
+                <a:latin typeface="맑은 고딕" panose="020B0503020000020004" pitchFamily="50" charset="-127"/>
+                <a:ea typeface="맑은 고딕" panose="020B0503020000020004" pitchFamily="50" charset="-127"/>
+                <a:cs typeface="Gothic A1 ExtraBold"/>
+                <a:sym typeface="Gothic A1 ExtraBold"/>
+              </a:rPr>
+              <a:t>(</a:t>
+            </a:r>
+            <a:r>
+              <a:rPr lang="ko-KR" altLang="en-US" sz="1200" dirty="0">
+                <a:solidFill>
+                  <a:srgbClr val="FFFFFF"/>
+                </a:solidFill>
+                <a:latin typeface="맑은 고딕" panose="020B0503020000020004" pitchFamily="50" charset="-127"/>
+                <a:ea typeface="맑은 고딕" panose="020B0503020000020004" pitchFamily="50" charset="-127"/>
+                <a:cs typeface="Gothic A1 ExtraBold"/>
+                <a:sym typeface="Gothic A1 ExtraBold"/>
+              </a:rPr>
+              <a:t>진행중</a:t>
+            </a:r>
+            <a:r>
+              <a:rPr lang="en-US" altLang="ko-KR" sz="1200" dirty="0">
+                <a:solidFill>
+                  <a:srgbClr val="FFFFFF"/>
+                </a:solidFill>
+                <a:latin typeface="맑은 고딕" panose="020B0503020000020004" pitchFamily="50" charset="-127"/>
+                <a:ea typeface="맑은 고딕" panose="020B0503020000020004" pitchFamily="50" charset="-127"/>
+                <a:cs typeface="Gothic A1 ExtraBold"/>
+                <a:sym typeface="Gothic A1 ExtraBold"/>
+              </a:rPr>
+              <a:t>)</a:t>
+            </a:r>
+            <a:endParaRPr sz="1200" dirty="0">
+              <a:solidFill>
+                <a:srgbClr val="FFFFFF"/>
+              </a:solidFill>
+              <a:latin typeface="맑은 고딕" panose="020B0503020000020004" pitchFamily="50" charset="-127"/>
+              <a:ea typeface="맑은 고딕" panose="020B0503020000020004" pitchFamily="50" charset="-127"/>
+              <a:cs typeface="Gothic A1 ExtraBold"/>
+              <a:sym typeface="Gothic A1 ExtraBold"/>
+            </a:endParaRPr>
+          </a:p>
+        </p:txBody>
+      </p:sp>
+      <p:sp>
+        <p:nvSpPr>
+          <p:cNvPr id="179" name="Google Shape;179;p20"/>
+          <p:cNvSpPr txBox="1"/>
+          <p:nvPr/>
+        </p:nvSpPr>
+        <p:spPr>
+          <a:xfrm>
+            <a:off x="580935" y="9926323"/>
+            <a:ext cx="5920800" cy="347700"/>
+          </a:xfrm>
+          <a:prstGeom prst="rect">
+            <a:avLst/>
+          </a:prstGeom>
+          <a:noFill/>
+          <a:ln>
+            <a:noFill/>
+          </a:ln>
+        </p:spPr>
+        <p:txBody>
+          <a:bodyPr spcFirstLastPara="1" wrap="square" lIns="91425" tIns="91425" rIns="91425" bIns="91425" anchor="t" anchorCtr="0">
+            <a:noAutofit/>
+          </a:bodyPr>
+          <a:lstStyle/>
+          <a:p>
+            <a:pPr marL="0" lvl="0" indent="0" algn="l" rtl="0">
+              <a:spcBef>
+                <a:spcPts val="0"/>
+              </a:spcBef>
+              <a:spcAft>
+                <a:spcPts val="0"/>
+              </a:spcAft>
+              <a:buNone/>
+            </a:pPr>
+            <a:r>
+              <a:rPr lang="ko-KR" altLang="en-US" sz="1200" dirty="0">
+                <a:solidFill>
+                  <a:srgbClr val="FFFFFF"/>
+                </a:solidFill>
+                <a:latin typeface="맑은 고딕" panose="020B0503020000020004" pitchFamily="50" charset="-127"/>
+                <a:ea typeface="맑은 고딕" panose="020B0503020000020004" pitchFamily="50" charset="-127"/>
+                <a:cs typeface="Gothic A1 ExtraBold"/>
+                <a:sym typeface="Gothic A1 ExtraBold"/>
+              </a:rPr>
+              <a:t>프로젝트 현황 </a:t>
+            </a:r>
+            <a:r>
+              <a:rPr lang="en-US" altLang="ko-KR" sz="1200" dirty="0">
+                <a:solidFill>
+                  <a:srgbClr val="FFFFFF"/>
+                </a:solidFill>
+                <a:latin typeface="맑은 고딕" panose="020B0503020000020004" pitchFamily="50" charset="-127"/>
+                <a:ea typeface="맑은 고딕" panose="020B0503020000020004" pitchFamily="50" charset="-127"/>
+                <a:cs typeface="Gothic A1 ExtraBold"/>
+                <a:sym typeface="Gothic A1 ExtraBold"/>
+              </a:rPr>
+              <a:t>: https://github.com/OTKRyu/cargo_auction</a:t>
+            </a:r>
+            <a:endParaRPr lang="ko-KR" altLang="en-US" sz="1200" dirty="0">
+              <a:solidFill>
+                <a:srgbClr val="FFFFFF"/>
+              </a:solidFill>
+              <a:latin typeface="맑은 고딕" panose="020B0503020000020004" pitchFamily="50" charset="-127"/>
+              <a:ea typeface="맑은 고딕" panose="020B0503020000020004" pitchFamily="50" charset="-127"/>
+              <a:cs typeface="Gothic A1 ExtraBold"/>
+              <a:sym typeface="Gothic A1 ExtraBold"/>
+            </a:endParaRPr>
+          </a:p>
+        </p:txBody>
+      </p:sp>
+      <p:sp>
+        <p:nvSpPr>
+          <p:cNvPr id="180" name="Google Shape;180;p20"/>
+          <p:cNvSpPr txBox="1"/>
+          <p:nvPr/>
+        </p:nvSpPr>
+        <p:spPr>
+          <a:xfrm>
+            <a:off x="550770" y="7486215"/>
+            <a:ext cx="1672468" cy="1484700"/>
+          </a:xfrm>
+          <a:prstGeom prst="rect">
+            <a:avLst/>
+          </a:prstGeom>
+          <a:noFill/>
+          <a:ln>
+            <a:noFill/>
+          </a:ln>
+        </p:spPr>
+        <p:txBody>
+          <a:bodyPr spcFirstLastPara="1" wrap="square" lIns="91425" tIns="91425" rIns="91425" bIns="91425" anchor="t" anchorCtr="0">
+            <a:noAutofit/>
+          </a:bodyPr>
+          <a:lstStyle/>
+          <a:p>
+            <a:pPr marL="0" lvl="0" indent="0" algn="l" rtl="0">
+              <a:spcBef>
+                <a:spcPts val="0"/>
+              </a:spcBef>
+              <a:spcAft>
+                <a:spcPts val="0"/>
+              </a:spcAft>
+              <a:buNone/>
+            </a:pPr>
+            <a:r>
+              <a:rPr lang="en" sz="8000" b="1" dirty="0">
+                <a:solidFill>
+                  <a:srgbClr val="FFFFFF"/>
+                </a:solidFill>
+                <a:latin typeface="맑은 고딕" panose="020B0503020000020004" pitchFamily="50" charset="-127"/>
+                <a:ea typeface="맑은 고딕" panose="020B0503020000020004" pitchFamily="50" charset="-127"/>
+                <a:cs typeface="Gothic A1 Black" pitchFamily="2" charset="-127"/>
+                <a:sym typeface="맑은 고딕"/>
+              </a:rPr>
+              <a:t>02</a:t>
+            </a:r>
+            <a:endParaRPr sz="8000" b="1" dirty="0">
+              <a:solidFill>
+                <a:srgbClr val="FFFFFF"/>
+              </a:solidFill>
+              <a:latin typeface="맑은 고딕" panose="020B0503020000020004" pitchFamily="50" charset="-127"/>
+              <a:ea typeface="맑은 고딕" panose="020B0503020000020004" pitchFamily="50" charset="-127"/>
+              <a:cs typeface="Gothic A1 Black" pitchFamily="2" charset="-127"/>
+              <a:sym typeface="맑은 고딕"/>
+            </a:endParaRPr>
+          </a:p>
+        </p:txBody>
+      </p:sp>
+    </p:spTree>
+    <p:extLst>
+      <p:ext uri="{BB962C8B-B14F-4D97-AF65-F5344CB8AC3E}">
+        <p14:creationId xmlns:p14="http://schemas.microsoft.com/office/powerpoint/2010/main" val="3001209910"/>
+      </p:ext>
+    </p:extLst>
+  </p:cSld>
+  <p:clrMapOvr>
+    <a:masterClrMapping/>
+  </p:clrMapOvr>
+</p:sld>
+</file>
+
+<file path=ppt/slides/slide6.xml><?xml version="1.0" encoding="utf-8"?>
+<p:sld xmlns:a="http://schemas.openxmlformats.org/drawingml/2006/main" xmlns:r="http://schemas.openxmlformats.org/officeDocument/2006/relationships" xmlns:p="http://schemas.openxmlformats.org/presentationml/2006/main">
+  <p:cSld>
+    <p:spTree>
+      <p:nvGrpSpPr>
+        <p:cNvPr id="1" name="Shape 191"/>
+        <p:cNvGrpSpPr/>
+        <p:nvPr/>
+      </p:nvGrpSpPr>
+      <p:grpSpPr>
+        <a:xfrm>
+          <a:off x="0" y="0"/>
+          <a:ext cx="0" cy="0"/>
+          <a:chOff x="0" y="0"/>
+          <a:chExt cx="0" cy="0"/>
+        </a:xfrm>
+      </p:grpSpPr>
+      <p:sp>
+        <p:nvSpPr>
+          <p:cNvPr id="11" name="Google Shape;188;p21"/>
+          <p:cNvSpPr txBox="1"/>
+          <p:nvPr/>
+        </p:nvSpPr>
+        <p:spPr>
+          <a:xfrm>
+            <a:off x="360000" y="360002"/>
+            <a:ext cx="5920800" cy="365100"/>
+          </a:xfrm>
+          <a:prstGeom prst="rect">
+            <a:avLst/>
+          </a:prstGeom>
+          <a:noFill/>
+          <a:ln>
+            <a:noFill/>
+          </a:ln>
+        </p:spPr>
+        <p:txBody>
+          <a:bodyPr spcFirstLastPara="1" wrap="square" lIns="0" tIns="0" rIns="0" bIns="0" anchor="t" anchorCtr="0">
+            <a:noAutofit/>
+          </a:bodyPr>
+          <a:lstStyle/>
+          <a:p>
+            <a:pPr lvl="0"/>
+            <a:r>
+              <a:rPr lang="en-US" altLang="ko-KR" sz="2000" dirty="0" err="1">
+                <a:latin typeface="맑은 고딕" panose="020B0503020000020004" pitchFamily="50" charset="-127"/>
+                <a:ea typeface="맑은 고딕" panose="020B0503020000020004" pitchFamily="50" charset="-127"/>
+                <a:cs typeface="Gothic A1 ExtraBold"/>
+                <a:sym typeface="Gothic A1 ExtraBold"/>
+              </a:rPr>
+              <a:t>Cargo_auction</a:t>
+            </a:r>
+            <a:endParaRPr lang="ko-KR" altLang="en-US" sz="2000" dirty="0">
+              <a:latin typeface="맑은 고딕" panose="020B0503020000020004" pitchFamily="50" charset="-127"/>
+              <a:ea typeface="맑은 고딕" panose="020B0503020000020004" pitchFamily="50" charset="-127"/>
+              <a:cs typeface="Gothic A1 ExtraBold"/>
+              <a:sym typeface="Gothic A1 ExtraBold"/>
+            </a:endParaRPr>
+          </a:p>
+        </p:txBody>
+      </p:sp>
+      <p:sp>
+        <p:nvSpPr>
+          <p:cNvPr id="12" name="Google Shape;189;p21"/>
+          <p:cNvSpPr txBox="1"/>
+          <p:nvPr/>
+        </p:nvSpPr>
+        <p:spPr>
+          <a:xfrm>
+            <a:off x="360000" y="1210709"/>
+            <a:ext cx="6839992" cy="191573"/>
+          </a:xfrm>
+          <a:prstGeom prst="rect">
+            <a:avLst/>
+          </a:prstGeom>
+          <a:noFill/>
+          <a:ln>
+            <a:noFill/>
+          </a:ln>
+        </p:spPr>
+        <p:txBody>
+          <a:bodyPr spcFirstLastPara="1" wrap="square" lIns="0" tIns="0" rIns="0" bIns="0" anchor="t" anchorCtr="0">
+            <a:noAutofit/>
+          </a:bodyPr>
+          <a:lstStyle/>
+          <a:p>
+            <a:pPr lvl="0" algn="just">
+              <a:lnSpc>
+                <a:spcPct val="115000"/>
+              </a:lnSpc>
+            </a:pPr>
+            <a:r>
+              <a:rPr lang="ko-KR" altLang="en-US" sz="1200" dirty="0">
+                <a:solidFill>
+                  <a:schemeClr val="tx1">
+                    <a:lumMod val="85000"/>
+                    <a:lumOff val="15000"/>
+                  </a:schemeClr>
+                </a:solidFill>
+                <a:latin typeface="맑은 고딕" panose="020B0503020000020004" pitchFamily="50" charset="-127"/>
+                <a:ea typeface="맑은 고딕" panose="020B0503020000020004" pitchFamily="50" charset="-127"/>
+                <a:cs typeface="Gothic A1 ExtraBold"/>
+                <a:sym typeface="Gothic A1 ExtraBold"/>
+              </a:rPr>
+              <a:t>기 간 </a:t>
+            </a:r>
+            <a:r>
+              <a:rPr lang="en-US" altLang="ko-KR" sz="1200" dirty="0">
+                <a:solidFill>
+                  <a:schemeClr val="tx1">
+                    <a:lumMod val="85000"/>
+                    <a:lumOff val="15000"/>
+                  </a:schemeClr>
+                </a:solidFill>
+                <a:latin typeface="맑은 고딕" panose="020B0503020000020004" pitchFamily="50" charset="-127"/>
+                <a:ea typeface="맑은 고딕" panose="020B0503020000020004" pitchFamily="50" charset="-127"/>
+                <a:cs typeface="Gothic A1 ExtraBold"/>
+                <a:sym typeface="Gothic A1 ExtraBold"/>
+              </a:rPr>
+              <a:t> :  2022.11 – </a:t>
+            </a:r>
+            <a:r>
+              <a:rPr lang="ko-KR" altLang="en-US" sz="1200" dirty="0">
+                <a:solidFill>
+                  <a:schemeClr val="tx1">
+                    <a:lumMod val="85000"/>
+                    <a:lumOff val="15000"/>
+                  </a:schemeClr>
+                </a:solidFill>
+                <a:latin typeface="맑은 고딕" panose="020B0503020000020004" pitchFamily="50" charset="-127"/>
+                <a:ea typeface="맑은 고딕" panose="020B0503020000020004" pitchFamily="50" charset="-127"/>
+                <a:cs typeface="Gothic A1 ExtraBold"/>
+                <a:sym typeface="Gothic A1 ExtraBold"/>
+              </a:rPr>
+              <a:t>현재</a:t>
+            </a:r>
+            <a:r>
+              <a:rPr lang="en-US" altLang="ko-KR" sz="1200" dirty="0">
+                <a:solidFill>
+                  <a:schemeClr val="tx1">
+                    <a:lumMod val="85000"/>
+                    <a:lumOff val="15000"/>
+                  </a:schemeClr>
+                </a:solidFill>
+                <a:latin typeface="맑은 고딕" panose="020B0503020000020004" pitchFamily="50" charset="-127"/>
+                <a:ea typeface="맑은 고딕" panose="020B0503020000020004" pitchFamily="50" charset="-127"/>
+                <a:cs typeface="Gothic A1 ExtraBold"/>
+                <a:sym typeface="Gothic A1 ExtraBold"/>
+              </a:rPr>
+              <a:t>(</a:t>
+            </a:r>
+            <a:r>
+              <a:rPr lang="ko-KR" altLang="en-US" sz="1200" dirty="0" err="1">
+                <a:solidFill>
+                  <a:schemeClr val="tx1">
+                    <a:lumMod val="85000"/>
+                    <a:lumOff val="15000"/>
+                  </a:schemeClr>
+                </a:solidFill>
+                <a:latin typeface="맑은 고딕" panose="020B0503020000020004" pitchFamily="50" charset="-127"/>
+                <a:ea typeface="맑은 고딕" panose="020B0503020000020004" pitchFamily="50" charset="-127"/>
+                <a:cs typeface="Gothic A1 ExtraBold"/>
+                <a:sym typeface="Gothic A1 ExtraBold"/>
+              </a:rPr>
+              <a:t>진해중</a:t>
+            </a:r>
+            <a:r>
+              <a:rPr lang="en-US" altLang="ko-KR" sz="1200" dirty="0">
+                <a:solidFill>
+                  <a:schemeClr val="tx1">
+                    <a:lumMod val="85000"/>
+                    <a:lumOff val="15000"/>
+                  </a:schemeClr>
+                </a:solidFill>
+                <a:latin typeface="맑은 고딕" panose="020B0503020000020004" pitchFamily="50" charset="-127"/>
+                <a:ea typeface="맑은 고딕" panose="020B0503020000020004" pitchFamily="50" charset="-127"/>
+                <a:cs typeface="Gothic A1 ExtraBold"/>
+                <a:sym typeface="Gothic A1 ExtraBold"/>
+              </a:rPr>
+              <a:t>)</a:t>
+            </a:r>
+            <a:endParaRPr sz="1200" dirty="0">
+              <a:solidFill>
+                <a:schemeClr val="tx1">
+                  <a:lumMod val="85000"/>
+                  <a:lumOff val="15000"/>
+                </a:schemeClr>
+              </a:solidFill>
+              <a:latin typeface="맑은 고딕" panose="020B0503020000020004" pitchFamily="50" charset="-127"/>
+              <a:ea typeface="맑은 고딕" panose="020B0503020000020004" pitchFamily="50" charset="-127"/>
+              <a:cs typeface="Gothic A1 ExtraBold"/>
+              <a:sym typeface="Gothic A1 ExtraBold"/>
+            </a:endParaRPr>
+          </a:p>
+        </p:txBody>
+      </p:sp>
+      <p:sp>
+        <p:nvSpPr>
+          <p:cNvPr id="13" name="Google Shape;190;p21"/>
+          <p:cNvSpPr txBox="1"/>
+          <p:nvPr/>
+        </p:nvSpPr>
+        <p:spPr>
+          <a:xfrm>
+            <a:off x="359999" y="1749637"/>
+            <a:ext cx="6839993" cy="1186548"/>
+          </a:xfrm>
+          <a:prstGeom prst="rect">
+            <a:avLst/>
+          </a:prstGeom>
+          <a:noFill/>
+          <a:ln>
+            <a:noFill/>
+          </a:ln>
+        </p:spPr>
+        <p:txBody>
+          <a:bodyPr spcFirstLastPara="1" wrap="square" lIns="0" tIns="0" rIns="0" bIns="0" anchor="t" anchorCtr="0">
+            <a:noAutofit/>
+          </a:bodyPr>
+          <a:lstStyle/>
+          <a:p>
+            <a:pPr lvl="0">
+              <a:lnSpc>
+                <a:spcPct val="150000"/>
+              </a:lnSpc>
+            </a:pPr>
+            <a:r>
+              <a:rPr lang="en-US" altLang="ko-KR" sz="1200" dirty="0">
+                <a:latin typeface="맑은 고딕" panose="020B0503020000020004" pitchFamily="50" charset="-127"/>
+                <a:ea typeface="맑은 고딕" panose="020B0503020000020004" pitchFamily="50" charset="-127"/>
+                <a:cs typeface="Gothic A1"/>
+                <a:sym typeface="Gothic A1"/>
+              </a:rPr>
+              <a:t>2022</a:t>
+            </a:r>
+            <a:r>
+              <a:rPr lang="ko-KR" altLang="en-US" sz="1200" dirty="0">
+                <a:latin typeface="맑은 고딕" panose="020B0503020000020004" pitchFamily="50" charset="-127"/>
+                <a:ea typeface="맑은 고딕" panose="020B0503020000020004" pitchFamily="50" charset="-127"/>
+                <a:cs typeface="Gothic A1"/>
+                <a:sym typeface="Gothic A1"/>
+              </a:rPr>
+              <a:t>년 말에 있었던 화물 노조 파업 건을 겪으며</a:t>
+            </a:r>
+            <a:r>
+              <a:rPr lang="en-US" altLang="ko-KR" sz="1200" dirty="0">
+                <a:latin typeface="맑은 고딕" panose="020B0503020000020004" pitchFamily="50" charset="-127"/>
+                <a:ea typeface="맑은 고딕" panose="020B0503020000020004" pitchFamily="50" charset="-127"/>
+                <a:cs typeface="Gothic A1"/>
+                <a:sym typeface="Gothic A1"/>
+              </a:rPr>
+              <a:t>, </a:t>
+            </a:r>
+            <a:r>
+              <a:rPr lang="ko-KR" altLang="en-US" sz="1200" dirty="0">
+                <a:latin typeface="맑은 고딕" panose="020B0503020000020004" pitchFamily="50" charset="-127"/>
+                <a:ea typeface="맑은 고딕" panose="020B0503020000020004" pitchFamily="50" charset="-127"/>
+                <a:cs typeface="Gothic A1"/>
+                <a:sym typeface="Gothic A1"/>
+              </a:rPr>
+              <a:t>화물 기사와 화물주 사이에 중간 상을 거치지 않고 직접적으로 거래할 수 있는 플랫폼이 있었더라면</a:t>
+            </a:r>
+            <a:r>
+              <a:rPr lang="en-US" altLang="ko-KR" sz="1200" dirty="0">
+                <a:latin typeface="맑은 고딕" panose="020B0503020000020004" pitchFamily="50" charset="-127"/>
+                <a:ea typeface="맑은 고딕" panose="020B0503020000020004" pitchFamily="50" charset="-127"/>
+                <a:cs typeface="Gothic A1"/>
+                <a:sym typeface="Gothic A1"/>
+              </a:rPr>
+              <a:t>, </a:t>
+            </a:r>
+            <a:r>
+              <a:rPr lang="ko-KR" altLang="en-US" sz="1200" dirty="0">
+                <a:latin typeface="맑은 고딕" panose="020B0503020000020004" pitchFamily="50" charset="-127"/>
+                <a:ea typeface="맑은 고딕" panose="020B0503020000020004" pitchFamily="50" charset="-127"/>
+                <a:cs typeface="Gothic A1"/>
+                <a:sym typeface="Gothic A1"/>
+              </a:rPr>
+              <a:t>이렇게까지 되지 않았을 거라는 의견을 접함</a:t>
+            </a:r>
+            <a:r>
+              <a:rPr lang="en-US" altLang="ko-KR" sz="1200" dirty="0">
+                <a:latin typeface="맑은 고딕" panose="020B0503020000020004" pitchFamily="50" charset="-127"/>
+                <a:ea typeface="맑은 고딕" panose="020B0503020000020004" pitchFamily="50" charset="-127"/>
+                <a:cs typeface="Gothic A1"/>
+                <a:sym typeface="Gothic A1"/>
+              </a:rPr>
+              <a:t>.</a:t>
+            </a:r>
+          </a:p>
+          <a:p>
+            <a:pPr lvl="0">
+              <a:lnSpc>
+                <a:spcPct val="150000"/>
+              </a:lnSpc>
+            </a:pPr>
+            <a:r>
+              <a:rPr lang="ko-KR" altLang="en-US" sz="1200" dirty="0">
+                <a:latin typeface="맑은 고딕" panose="020B0503020000020004" pitchFamily="50" charset="-127"/>
+                <a:ea typeface="맑은 고딕" panose="020B0503020000020004" pitchFamily="50" charset="-127"/>
+                <a:cs typeface="Gothic A1"/>
+                <a:sym typeface="Gothic A1"/>
+              </a:rPr>
+              <a:t>실제로 유통은 중간 단계를 거치면서 발생하는 문제들이 많다고 생각해</a:t>
+            </a:r>
+            <a:r>
+              <a:rPr lang="en-US" altLang="ko-KR" sz="1200" dirty="0">
+                <a:latin typeface="맑은 고딕" panose="020B0503020000020004" pitchFamily="50" charset="-127"/>
+                <a:ea typeface="맑은 고딕" panose="020B0503020000020004" pitchFamily="50" charset="-127"/>
+                <a:cs typeface="Gothic A1"/>
+                <a:sym typeface="Gothic A1"/>
+              </a:rPr>
+              <a:t>, </a:t>
+            </a:r>
+            <a:r>
+              <a:rPr lang="ko-KR" altLang="en-US" sz="1200" dirty="0">
+                <a:latin typeface="맑은 고딕" panose="020B0503020000020004" pitchFamily="50" charset="-127"/>
+                <a:ea typeface="맑은 고딕" panose="020B0503020000020004" pitchFamily="50" charset="-127"/>
+                <a:cs typeface="Gothic A1"/>
+                <a:sym typeface="Gothic A1"/>
+              </a:rPr>
+              <a:t>화물주와 운송 기사를 매칭시켜줄 수 있는 경매 프로그램을 제작하려고 시도함 </a:t>
+            </a:r>
+            <a:endParaRPr lang="en-US" altLang="ko-KR" sz="1200" dirty="0">
+              <a:latin typeface="맑은 고딕" panose="020B0503020000020004" pitchFamily="50" charset="-127"/>
+              <a:ea typeface="맑은 고딕" panose="020B0503020000020004" pitchFamily="50" charset="-127"/>
+              <a:cs typeface="Gothic A1"/>
+              <a:sym typeface="Gothic A1"/>
+            </a:endParaRPr>
+          </a:p>
+        </p:txBody>
+      </p:sp>
+      <p:sp>
+        <p:nvSpPr>
+          <p:cNvPr id="14" name="Google Shape;191;p21"/>
+          <p:cNvSpPr/>
+          <p:nvPr/>
+        </p:nvSpPr>
+        <p:spPr>
+          <a:xfrm>
+            <a:off x="378269" y="1054157"/>
+            <a:ext cx="6840000" cy="18300"/>
+          </a:xfrm>
+          <a:prstGeom prst="rect">
+            <a:avLst/>
+          </a:prstGeom>
+          <a:solidFill>
+            <a:srgbClr val="000000"/>
+          </a:solidFill>
+          <a:ln>
+            <a:noFill/>
+          </a:ln>
+        </p:spPr>
+        <p:txBody>
+          <a:bodyPr spcFirstLastPara="1" wrap="square" lIns="91425" tIns="91425" rIns="91425" bIns="91425" anchor="ctr" anchorCtr="0">
+            <a:noAutofit/>
+          </a:bodyPr>
+          <a:lstStyle/>
+          <a:p>
+            <a:pPr marL="0" lvl="0" indent="0" algn="l" rtl="0">
+              <a:spcBef>
+                <a:spcPts val="0"/>
+              </a:spcBef>
+              <a:spcAft>
+                <a:spcPts val="0"/>
+              </a:spcAft>
+              <a:buNone/>
+            </a:pPr>
+            <a:r>
+              <a:rPr lang="en" dirty="0">
+                <a:latin typeface="맑은 고딕" panose="020B0503020000020004" pitchFamily="50" charset="-127"/>
+              </a:rPr>
+              <a:t> </a:t>
+            </a:r>
+            <a:endParaRPr dirty="0">
+              <a:latin typeface="맑은 고딕" panose="020B0503020000020004" pitchFamily="50" charset="-127"/>
+            </a:endParaRPr>
+          </a:p>
+        </p:txBody>
+      </p:sp>
+      <p:sp>
+        <p:nvSpPr>
+          <p:cNvPr id="24" name="Google Shape;189;p21"/>
+          <p:cNvSpPr txBox="1"/>
+          <p:nvPr/>
+        </p:nvSpPr>
+        <p:spPr>
+          <a:xfrm>
+            <a:off x="360000" y="1467174"/>
+            <a:ext cx="6839992" cy="202364"/>
+          </a:xfrm>
+          <a:prstGeom prst="rect">
+            <a:avLst/>
+          </a:prstGeom>
+          <a:noFill/>
+          <a:ln>
+            <a:noFill/>
+          </a:ln>
+        </p:spPr>
+        <p:txBody>
+          <a:bodyPr spcFirstLastPara="1" wrap="square" lIns="0" tIns="0" rIns="0" bIns="0" anchor="t" anchorCtr="0">
+            <a:noAutofit/>
+          </a:bodyPr>
+          <a:lstStyle/>
+          <a:p>
+            <a:pPr marL="0" lvl="0" indent="0" algn="just" rtl="0">
+              <a:lnSpc>
+                <a:spcPct val="115000"/>
+              </a:lnSpc>
+              <a:spcBef>
+                <a:spcPts val="0"/>
+              </a:spcBef>
+              <a:spcAft>
+                <a:spcPts val="0"/>
+              </a:spcAft>
+              <a:buNone/>
+            </a:pPr>
+            <a:r>
+              <a:rPr lang="ko-KR" altLang="en-US" sz="1200" dirty="0">
+                <a:solidFill>
+                  <a:schemeClr val="tx1">
+                    <a:lumMod val="85000"/>
+                    <a:lumOff val="15000"/>
+                  </a:schemeClr>
+                </a:solidFill>
+                <a:latin typeface="맑은 고딕" panose="020B0503020000020004" pitchFamily="50" charset="-127"/>
+                <a:ea typeface="맑은 고딕" panose="020B0503020000020004" pitchFamily="50" charset="-127"/>
+                <a:cs typeface="Gothic A1 ExtraBold"/>
+                <a:sym typeface="Gothic A1 ExtraBold"/>
+              </a:rPr>
+              <a:t>개 요  </a:t>
+            </a:r>
+            <a:r>
+              <a:rPr lang="en-US" altLang="ko-KR" sz="1200" dirty="0">
+                <a:solidFill>
+                  <a:schemeClr val="tx1">
+                    <a:lumMod val="85000"/>
+                    <a:lumOff val="15000"/>
+                  </a:schemeClr>
+                </a:solidFill>
+                <a:latin typeface="맑은 고딕" panose="020B0503020000020004" pitchFamily="50" charset="-127"/>
+                <a:ea typeface="맑은 고딕" panose="020B0503020000020004" pitchFamily="50" charset="-127"/>
+                <a:cs typeface="Gothic A1 ExtraBold"/>
+                <a:sym typeface="Gothic A1 ExtraBold"/>
+              </a:rPr>
+              <a:t>:  </a:t>
+            </a:r>
+            <a:r>
+              <a:rPr lang="ko-KR" altLang="en-US" sz="1200" dirty="0">
+                <a:solidFill>
+                  <a:schemeClr val="tx1">
+                    <a:lumMod val="85000"/>
+                    <a:lumOff val="15000"/>
+                  </a:schemeClr>
+                </a:solidFill>
+                <a:latin typeface="맑은 고딕" panose="020B0503020000020004" pitchFamily="50" charset="-127"/>
+                <a:ea typeface="맑은 고딕" panose="020B0503020000020004" pitchFamily="50" charset="-127"/>
+                <a:cs typeface="Gothic A1 ExtraBold"/>
+                <a:sym typeface="Gothic A1 ExtraBold"/>
+              </a:rPr>
+              <a:t>화물주와 운송기사 간에 화물운송을 두고 경매할 수 있는 서비스</a:t>
+            </a:r>
+            <a:endParaRPr sz="1200" dirty="0">
+              <a:solidFill>
+                <a:schemeClr val="tx1">
+                  <a:lumMod val="85000"/>
+                  <a:lumOff val="15000"/>
+                </a:schemeClr>
+              </a:solidFill>
+              <a:latin typeface="맑은 고딕" panose="020B0503020000020004" pitchFamily="50" charset="-127"/>
+              <a:ea typeface="맑은 고딕" panose="020B0503020000020004" pitchFamily="50" charset="-127"/>
+              <a:cs typeface="Gothic A1 ExtraBold"/>
+              <a:sym typeface="Gothic A1 ExtraBold"/>
+            </a:endParaRPr>
+          </a:p>
+        </p:txBody>
+      </p:sp>
+      <p:graphicFrame>
+        <p:nvGraphicFramePr>
+          <p:cNvPr id="4" name="표 3"/>
+          <p:cNvGraphicFramePr>
+            <a:graphicFrameLocks noGrp="1"/>
+          </p:cNvGraphicFramePr>
+          <p:nvPr>
+            <p:extLst>
+              <p:ext uri="{D42A27DB-BD31-4B8C-83A1-F6EECF244321}">
+                <p14:modId xmlns:p14="http://schemas.microsoft.com/office/powerpoint/2010/main" val="3220192713"/>
+              </p:ext>
+            </p:extLst>
+          </p:nvPr>
+        </p:nvGraphicFramePr>
+        <p:xfrm>
+          <a:off x="309313" y="3140840"/>
+          <a:ext cx="6840153" cy="1397146"/>
+        </p:xfrm>
+        <a:graphic>
+          <a:graphicData uri="http://schemas.openxmlformats.org/drawingml/2006/table">
+            <a:tbl>
+              <a:tblPr firstRow="1" bandRow="1">
+                <a:tableStyleId>{5940675A-B579-460E-94D1-54222C63F5DA}</a:tableStyleId>
+              </a:tblPr>
+              <a:tblGrid>
+                <a:gridCol w="1415047">
+                  <a:extLst>
+                    <a:ext uri="{9D8B030D-6E8A-4147-A177-3AD203B41FA5}">
+                      <a16:colId xmlns:a16="http://schemas.microsoft.com/office/drawing/2014/main" val="20000"/>
+                    </a:ext>
+                  </a:extLst>
+                </a:gridCol>
+                <a:gridCol w="5425106">
+                  <a:extLst>
+                    <a:ext uri="{9D8B030D-6E8A-4147-A177-3AD203B41FA5}">
+                      <a16:colId xmlns:a16="http://schemas.microsoft.com/office/drawing/2014/main" val="20001"/>
+                    </a:ext>
+                  </a:extLst>
+                </a:gridCol>
+              </a:tblGrid>
+              <a:tr h="216856">
+                <a:tc>
+                  <a:txBody>
+                    <a:bodyPr/>
+                    <a:lstStyle/>
+                    <a:p>
+                      <a:pPr algn="ctr" latinLnBrk="1"/>
+                      <a:r>
+                        <a:rPr lang="ko-KR" altLang="en-US" sz="1200" u="none" strike="noStrike" cap="none" dirty="0">
+                          <a:solidFill>
+                            <a:schemeClr val="tx1"/>
+                          </a:solidFill>
+                          <a:latin typeface="맑은 고딕" panose="020B0503020000020004" pitchFamily="50" charset="-127"/>
+                          <a:ea typeface="맑은 고딕" panose="020B0503020000020004" pitchFamily="50" charset="-127"/>
+                          <a:sym typeface="Arial"/>
+                        </a:rPr>
+                        <a:t>담 당 역 할</a:t>
+                      </a:r>
+                      <a:endParaRPr lang="ko-KR" altLang="en-US" sz="1200" b="0" i="0" u="none" strike="noStrike" cap="none" dirty="0">
+                        <a:solidFill>
+                          <a:schemeClr val="tx1"/>
+                        </a:solidFill>
+                        <a:latin typeface="맑은 고딕" panose="020B0503020000020004" pitchFamily="50" charset="-127"/>
+                        <a:ea typeface="맑은 고딕" panose="020B0503020000020004" pitchFamily="50" charset="-127"/>
+                        <a:cs typeface="Gothic A1"/>
+                        <a:sym typeface="Arial"/>
+                      </a:endParaRPr>
+                    </a:p>
+                  </a:txBody>
+                  <a:tcPr anchor="ctr"/>
+                </a:tc>
+                <a:tc>
+                  <a:txBody>
+                    <a:bodyPr/>
+                    <a:lstStyle/>
+                    <a:p>
+                      <a:pPr latinLnBrk="1"/>
+                      <a:r>
+                        <a:rPr lang="ko-KR" altLang="en-US" sz="1200" b="0" i="0" u="none" strike="noStrike" cap="none" dirty="0" err="1">
+                          <a:solidFill>
+                            <a:schemeClr val="tx1"/>
+                          </a:solidFill>
+                          <a:latin typeface="맑은 고딕" panose="020B0503020000020004" pitchFamily="50" charset="-127"/>
+                          <a:ea typeface="맑은 고딕" panose="020B0503020000020004" pitchFamily="50" charset="-127"/>
+                          <a:cs typeface="Gothic A1"/>
+                          <a:sym typeface="Arial"/>
+                        </a:rPr>
+                        <a:t>풀스택</a:t>
+                      </a:r>
+                      <a:r>
+                        <a:rPr lang="ko-KR" altLang="en-US" sz="1200" b="0" i="0" u="none" strike="noStrike" cap="none" dirty="0">
+                          <a:solidFill>
+                            <a:schemeClr val="tx1"/>
+                          </a:solidFill>
+                          <a:latin typeface="맑은 고딕" panose="020B0503020000020004" pitchFamily="50" charset="-127"/>
+                          <a:ea typeface="맑은 고딕" panose="020B0503020000020004" pitchFamily="50" charset="-127"/>
+                          <a:cs typeface="Gothic A1"/>
+                          <a:sym typeface="Arial"/>
+                        </a:rPr>
+                        <a:t> 엔지니어</a:t>
+                      </a:r>
+                      <a:endParaRPr lang="en-US" altLang="ko-KR" sz="1200" b="0" i="0" u="none" strike="noStrike" cap="none" dirty="0">
+                        <a:solidFill>
+                          <a:schemeClr val="tx1"/>
+                        </a:solidFill>
+                        <a:latin typeface="맑은 고딕" panose="020B0503020000020004" pitchFamily="50" charset="-127"/>
+                        <a:ea typeface="맑은 고딕" panose="020B0503020000020004" pitchFamily="50" charset="-127"/>
+                        <a:cs typeface="Gothic A1"/>
+                        <a:sym typeface="Arial"/>
+                      </a:endParaRPr>
+                    </a:p>
+                  </a:txBody>
+                  <a:tcPr anchor="ctr"/>
+                </a:tc>
+                <a:extLst>
+                  <a:ext uri="{0D108BD9-81ED-4DB2-BD59-A6C34878D82A}">
+                    <a16:rowId xmlns:a16="http://schemas.microsoft.com/office/drawing/2014/main" val="10000"/>
+                  </a:ext>
+                </a:extLst>
+              </a:tr>
+              <a:tr h="216856">
+                <a:tc>
+                  <a:txBody>
+                    <a:bodyPr/>
+                    <a:lstStyle/>
+                    <a:p>
+                      <a:pPr algn="ctr" latinLnBrk="1"/>
+                      <a:r>
+                        <a:rPr lang="ko-KR" altLang="en-US" sz="1200" b="0" i="0" u="none" strike="noStrike" cap="none" dirty="0">
+                          <a:solidFill>
+                            <a:schemeClr val="tx1"/>
+                          </a:solidFill>
+                          <a:latin typeface="맑은 고딕" panose="020B0503020000020004" pitchFamily="50" charset="-127"/>
+                          <a:ea typeface="맑은 고딕" panose="020B0503020000020004" pitchFamily="50" charset="-127"/>
+                          <a:cs typeface="Gothic A1"/>
+                          <a:sym typeface="Arial"/>
+                        </a:rPr>
+                        <a:t>기 획 배 경</a:t>
+                      </a:r>
+                    </a:p>
+                  </a:txBody>
+                  <a:tcPr anchor="ctr"/>
+                </a:tc>
+                <a:tc>
+                  <a:txBody>
+                    <a:bodyPr/>
+                    <a:lstStyle/>
+                    <a:p>
+                      <a:pPr latinLnBrk="1"/>
+                      <a:r>
+                        <a:rPr lang="ko-KR" altLang="en-US" sz="1200" dirty="0">
+                          <a:solidFill>
+                            <a:schemeClr val="tx1">
+                              <a:lumMod val="85000"/>
+                              <a:lumOff val="15000"/>
+                            </a:schemeClr>
+                          </a:solidFill>
+                          <a:latin typeface="맑은 고딕" panose="020B0503020000020004" pitchFamily="50" charset="-127"/>
+                          <a:ea typeface="+mn-ea"/>
+                          <a:cs typeface="Gothic A1 ExtraBold"/>
+                          <a:sym typeface="Gothic A1 ExtraBold"/>
+                        </a:rPr>
+                        <a:t>화물주와 운송기사 간에 화물운송을 두고 경매할 수 있는 서비스</a:t>
+                      </a:r>
+                      <a:endParaRPr lang="en-US" altLang="ko-KR" sz="1200" b="0" i="0" u="none" strike="noStrike" cap="none" dirty="0">
+                        <a:solidFill>
+                          <a:schemeClr val="tx1"/>
+                        </a:solidFill>
+                        <a:latin typeface="맑은 고딕" panose="020B0503020000020004" pitchFamily="50" charset="-127"/>
+                        <a:ea typeface="맑은 고딕" panose="020B0503020000020004" pitchFamily="50" charset="-127"/>
+                        <a:cs typeface="Gothic A1"/>
+                        <a:sym typeface="Arial"/>
+                      </a:endParaRPr>
+                    </a:p>
+                  </a:txBody>
+                  <a:tcPr anchor="ctr"/>
+                </a:tc>
+                <a:extLst>
+                  <a:ext uri="{0D108BD9-81ED-4DB2-BD59-A6C34878D82A}">
+                    <a16:rowId xmlns:a16="http://schemas.microsoft.com/office/drawing/2014/main" val="2089004916"/>
+                  </a:ext>
+                </a:extLst>
+              </a:tr>
+              <a:tr h="424253">
+                <a:tc>
+                  <a:txBody>
+                    <a:bodyPr/>
+                    <a:lstStyle/>
+                    <a:p>
+                      <a:pPr algn="ctr" latinLnBrk="1"/>
+                      <a:r>
+                        <a:rPr lang="ko-KR" altLang="en-US" sz="1200" u="none" strike="noStrike" cap="none" dirty="0">
+                          <a:latin typeface="맑은 고딕" panose="020B0503020000020004" pitchFamily="50" charset="-127"/>
+                          <a:ea typeface="맑은 고딕" panose="020B0503020000020004" pitchFamily="50" charset="-127"/>
+                          <a:sym typeface="Arial"/>
+                        </a:rPr>
+                        <a:t>개 발 환 경</a:t>
+                      </a:r>
+                      <a:endParaRPr lang="ko-KR" altLang="en-US" sz="1200" b="0" i="0" u="none" strike="noStrike" cap="none" dirty="0">
+                        <a:solidFill>
+                          <a:schemeClr val="bg1"/>
+                        </a:solidFill>
+                        <a:latin typeface="맑은 고딕" panose="020B0503020000020004" pitchFamily="50" charset="-127"/>
+                        <a:ea typeface="맑은 고딕" panose="020B0503020000020004" pitchFamily="50" charset="-127"/>
+                        <a:cs typeface="Gothic A1"/>
+                        <a:sym typeface="Arial"/>
+                      </a:endParaRPr>
+                    </a:p>
+                  </a:txBody>
+                  <a:tcPr anchor="ctr"/>
+                </a:tc>
+                <a:tc>
+                  <a:txBody>
+                    <a:bodyPr/>
+                    <a:lstStyle/>
+                    <a:p>
+                      <a:pPr latinLnBrk="1"/>
+                      <a:r>
+                        <a:rPr lang="en-US" altLang="ko-KR" sz="1200" u="none" strike="noStrike" cap="none" dirty="0">
+                          <a:latin typeface="맑은 고딕" panose="020B0503020000020004" pitchFamily="50" charset="-127"/>
+                          <a:ea typeface="맑은 고딕" panose="020B0503020000020004" pitchFamily="50" charset="-127"/>
+                          <a:sym typeface="Arial"/>
+                        </a:rPr>
+                        <a:t>Node.js, Typescript, Redis, </a:t>
+                      </a:r>
+                      <a:r>
+                        <a:rPr lang="en-US" altLang="ko-KR" sz="1200" u="none" strike="noStrike" cap="none" dirty="0" err="1">
+                          <a:latin typeface="맑은 고딕" panose="020B0503020000020004" pitchFamily="50" charset="-127"/>
+                          <a:ea typeface="맑은 고딕" panose="020B0503020000020004" pitchFamily="50" charset="-127"/>
+                          <a:sym typeface="Arial"/>
+                        </a:rPr>
+                        <a:t>Mysql</a:t>
+                      </a:r>
+                      <a:endParaRPr lang="en-US" altLang="ko-KR" sz="1200" b="0" i="0" u="none" strike="noStrike" cap="none" dirty="0">
+                        <a:solidFill>
+                          <a:srgbClr val="000000"/>
+                        </a:solidFill>
+                        <a:latin typeface="맑은 고딕" panose="020B0503020000020004" pitchFamily="50" charset="-127"/>
+                        <a:ea typeface="맑은 고딕" panose="020B0503020000020004" pitchFamily="50" charset="-127"/>
+                        <a:cs typeface="Gothic A1"/>
+                        <a:sym typeface="Arial"/>
+                      </a:endParaRPr>
+                    </a:p>
+                  </a:txBody>
+                  <a:tcPr anchor="ctr"/>
+                </a:tc>
+                <a:extLst>
+                  <a:ext uri="{0D108BD9-81ED-4DB2-BD59-A6C34878D82A}">
+                    <a16:rowId xmlns:a16="http://schemas.microsoft.com/office/drawing/2014/main" val="10002"/>
+                  </a:ext>
+                </a:extLst>
+              </a:tr>
+              <a:tr h="424253">
+                <a:tc>
+                  <a:txBody>
+                    <a:bodyPr/>
+                    <a:lstStyle/>
+                    <a:p>
+                      <a:pPr algn="ctr" latinLnBrk="1"/>
+                      <a:r>
+                        <a:rPr lang="ko-KR" altLang="en-US" sz="1200" u="none" strike="noStrike" cap="none" dirty="0">
+                          <a:latin typeface="맑은 고딕" panose="020B0503020000020004" pitchFamily="50" charset="-127"/>
+                          <a:ea typeface="맑은 고딕" panose="020B0503020000020004" pitchFamily="50" charset="-127"/>
+                          <a:sym typeface="Arial"/>
+                        </a:rPr>
+                        <a:t>구 현 사 항</a:t>
+                      </a:r>
+                      <a:endParaRPr lang="ko-KR" altLang="en-US" sz="1200" b="0" i="0" u="none" strike="noStrike" cap="none" dirty="0">
+                        <a:solidFill>
+                          <a:schemeClr val="bg1"/>
+                        </a:solidFill>
+                        <a:latin typeface="맑은 고딕" panose="020B0503020000020004" pitchFamily="50" charset="-127"/>
+                        <a:ea typeface="맑은 고딕" panose="020B0503020000020004" pitchFamily="50" charset="-127"/>
+                        <a:cs typeface="Gothic A1"/>
+                        <a:sym typeface="Arial"/>
+                      </a:endParaRPr>
+                    </a:p>
+                  </a:txBody>
+                  <a:tcPr anchor="ctr"/>
+                </a:tc>
+                <a:tc>
+                  <a:txBody>
+                    <a:bodyPr/>
+                    <a:lstStyle/>
+                    <a:p>
+                      <a:pPr latinLnBrk="1"/>
+                      <a:endParaRPr lang="en-US" altLang="ko-KR" sz="1200" b="0" i="0" u="none" strike="noStrike" cap="none" baseline="0" dirty="0">
+                        <a:solidFill>
+                          <a:schemeClr val="tx1"/>
+                        </a:solidFill>
+                        <a:latin typeface="맑은 고딕" panose="020B0503020000020004" pitchFamily="50" charset="-127"/>
+                        <a:ea typeface="맑은 고딕" panose="020B0503020000020004" pitchFamily="50" charset="-127"/>
+                        <a:cs typeface="+mn-cs"/>
+                        <a:sym typeface="Arial"/>
+                      </a:endParaRPr>
+                    </a:p>
+                  </a:txBody>
+                  <a:tcPr anchor="ctr"/>
+                </a:tc>
+                <a:extLst>
+                  <a:ext uri="{0D108BD9-81ED-4DB2-BD59-A6C34878D82A}">
+                    <a16:rowId xmlns:a16="http://schemas.microsoft.com/office/drawing/2014/main" val="10004"/>
+                  </a:ext>
+                </a:extLst>
+              </a:tr>
+            </a:tbl>
+          </a:graphicData>
+        </a:graphic>
+      </p:graphicFrame>
+      <p:sp>
+        <p:nvSpPr>
+          <p:cNvPr id="30" name="모서리가 둥근 직사각형 29">
+            <a:extLst>
+              <a:ext uri="{FF2B5EF4-FFF2-40B4-BE49-F238E27FC236}">
+                <a16:creationId xmlns:a16="http://schemas.microsoft.com/office/drawing/2014/main" id="{18F0A5A2-F248-004A-B003-DFD30B7A7A21}"/>
+              </a:ext>
+            </a:extLst>
+          </p:cNvPr>
+          <p:cNvSpPr/>
+          <p:nvPr/>
+        </p:nvSpPr>
+        <p:spPr>
+          <a:xfrm>
+            <a:off x="378269" y="9970519"/>
+            <a:ext cx="5078399" cy="377368"/>
+          </a:xfrm>
+          <a:prstGeom prst="roundRect">
+            <a:avLst>
+              <a:gd name="adj" fmla="val 12325"/>
+            </a:avLst>
+          </a:prstGeom>
+          <a:solidFill>
+            <a:schemeClr val="bg1">
+              <a:lumMod val="95000"/>
+            </a:schemeClr>
+          </a:solidFill>
+          <a:ln w="12700">
+            <a:solidFill>
+              <a:schemeClr val="bg1">
+                <a:lumMod val="85000"/>
+              </a:schemeClr>
+            </a:solidFill>
+          </a:ln>
+        </p:spPr>
+        <p:style>
+          <a:lnRef idx="2">
+            <a:schemeClr val="accent1">
+              <a:shade val="50000"/>
+            </a:schemeClr>
+          </a:lnRef>
+          <a:fillRef idx="1">
+            <a:schemeClr val="accent1"/>
+          </a:fillRef>
+          <a:effectRef idx="0">
+            <a:schemeClr val="accent1"/>
+          </a:effectRef>
+          <a:fontRef idx="minor">
+            <a:schemeClr val="lt1"/>
+          </a:fontRef>
+        </p:style>
+        <p:txBody>
+          <a:bodyPr rtlCol="0" anchor="ctr"/>
+          <a:lstStyle/>
+          <a:p>
+            <a:pPr algn="ctr"/>
+            <a:endParaRPr kumimoji="1" lang="ko-Kore-KR" altLang="en-US" dirty="0"/>
+          </a:p>
+        </p:txBody>
+      </p:sp>
+      <p:sp>
+        <p:nvSpPr>
+          <p:cNvPr id="31" name="TextBox 30">
+            <a:extLst>
+              <a:ext uri="{FF2B5EF4-FFF2-40B4-BE49-F238E27FC236}">
+                <a16:creationId xmlns:a16="http://schemas.microsoft.com/office/drawing/2014/main" id="{8A19632E-63D3-914F-8EAC-9863E4EC9293}"/>
+              </a:ext>
+            </a:extLst>
+          </p:cNvPr>
+          <p:cNvSpPr txBox="1"/>
+          <p:nvPr/>
+        </p:nvSpPr>
+        <p:spPr>
+          <a:xfrm>
+            <a:off x="710652" y="10042253"/>
+            <a:ext cx="492370" cy="241980"/>
+          </a:xfrm>
+          <a:prstGeom prst="rect">
+            <a:avLst/>
+          </a:prstGeom>
+          <a:noFill/>
+        </p:spPr>
+        <p:txBody>
+          <a:bodyPr wrap="square" lIns="36000" tIns="36000" rIns="36000" bIns="36000" rtlCol="0">
+            <a:spAutoFit/>
+          </a:bodyPr>
+          <a:lstStyle/>
+          <a:p>
+            <a:r>
+              <a:rPr kumimoji="1" lang="ko-Kore-KR" altLang="en-US" sz="1100" dirty="0">
+                <a:solidFill>
+                  <a:schemeClr val="bg1">
+                    <a:lumMod val="85000"/>
+                  </a:schemeClr>
+                </a:solidFill>
+                <a:latin typeface="맑은 고딕" panose="020B0503020000020004" pitchFamily="50" charset="-127"/>
+                <a:ea typeface="맑은 고딕" panose="020B0503020000020004" pitchFamily="50" charset="-127"/>
+                <a:cs typeface="Gothic A1" pitchFamily="2" charset="-127"/>
+              </a:rPr>
+              <a:t>링크</a:t>
+            </a:r>
+            <a:r>
+              <a:rPr kumimoji="1" lang="en-US" altLang="ko-Kore-KR" sz="1100" dirty="0">
+                <a:solidFill>
+                  <a:schemeClr val="bg1">
+                    <a:lumMod val="85000"/>
+                  </a:schemeClr>
+                </a:solidFill>
+                <a:latin typeface="Gothic A1" pitchFamily="2" charset="-127"/>
+                <a:ea typeface="Gothic A1" pitchFamily="2" charset="-127"/>
+                <a:cs typeface="Gothic A1" pitchFamily="2" charset="-127"/>
+              </a:rPr>
+              <a:t>  |</a:t>
+            </a:r>
+            <a:endParaRPr kumimoji="1" lang="ko-Kore-KR" altLang="en-US" sz="1100" dirty="0">
+              <a:solidFill>
+                <a:schemeClr val="bg1">
+                  <a:lumMod val="85000"/>
+                </a:schemeClr>
+              </a:solidFill>
+              <a:latin typeface="Gothic A1" pitchFamily="2" charset="-127"/>
+              <a:ea typeface="Gothic A1" pitchFamily="2" charset="-127"/>
+              <a:cs typeface="Gothic A1" pitchFamily="2" charset="-127"/>
+            </a:endParaRPr>
+          </a:p>
+        </p:txBody>
+      </p:sp>
+      <p:pic>
+        <p:nvPicPr>
+          <p:cNvPr id="32" name="그림 31">
+            <a:extLst>
+              <a:ext uri="{FF2B5EF4-FFF2-40B4-BE49-F238E27FC236}">
+                <a16:creationId xmlns:a16="http://schemas.microsoft.com/office/drawing/2014/main" id="{D1149479-E09A-374D-9947-E973826635BB}"/>
+              </a:ext>
+            </a:extLst>
+          </p:cNvPr>
+          <p:cNvPicPr>
+            <a:picLocks noChangeAspect="1"/>
+          </p:cNvPicPr>
+          <p:nvPr/>
+        </p:nvPicPr>
+        <p:blipFill>
+          <a:blip r:embed="rId3"/>
+          <a:stretch>
+            <a:fillRect/>
+          </a:stretch>
+        </p:blipFill>
+        <p:spPr>
+          <a:xfrm>
+            <a:off x="544138" y="10077653"/>
+            <a:ext cx="162000" cy="162000"/>
+          </a:xfrm>
+          <a:prstGeom prst="rect">
+            <a:avLst/>
+          </a:prstGeom>
+        </p:spPr>
+      </p:pic>
+      <p:sp>
+        <p:nvSpPr>
+          <p:cNvPr id="33" name="TextBox 32">
+            <a:extLst>
+              <a:ext uri="{FF2B5EF4-FFF2-40B4-BE49-F238E27FC236}">
+                <a16:creationId xmlns:a16="http://schemas.microsoft.com/office/drawing/2014/main" id="{5E366BAC-AC3E-7E40-8942-2960BDAD9797}"/>
+              </a:ext>
+            </a:extLst>
+          </p:cNvPr>
+          <p:cNvSpPr txBox="1"/>
+          <p:nvPr/>
+        </p:nvSpPr>
+        <p:spPr>
+          <a:xfrm>
+            <a:off x="1203022" y="9997971"/>
+            <a:ext cx="4140001" cy="293918"/>
+          </a:xfrm>
+          <a:prstGeom prst="rect">
+            <a:avLst/>
+          </a:prstGeom>
+          <a:noFill/>
+        </p:spPr>
+        <p:txBody>
+          <a:bodyPr wrap="square" lIns="36000" tIns="36000" rIns="36000" bIns="36000" rtlCol="0" anchor="ctr">
+            <a:spAutoFit/>
+          </a:bodyPr>
+          <a:lstStyle/>
+          <a:p>
+            <a:pPr lvl="0">
+              <a:lnSpc>
+                <a:spcPct val="150000"/>
+              </a:lnSpc>
+            </a:pPr>
+            <a:r>
+              <a:rPr lang="en-US" altLang="ko-KR" sz="1100" dirty="0">
+                <a:solidFill>
+                  <a:schemeClr val="tx1"/>
+                </a:solidFill>
+                <a:latin typeface="맑은 고딕" panose="020B0503020000020004" pitchFamily="50" charset="-127"/>
+                <a:ea typeface="맑은 고딕" panose="020B0503020000020004" pitchFamily="50" charset="-127"/>
+                <a:cs typeface="Gothic A1 ExtraBold"/>
+                <a:sym typeface="Gothic A1 ExtraBold"/>
+                <a:hlinkClick r:id="rId4"/>
+              </a:rPr>
+              <a:t>https://github.com/OTKRyu/cargo_auction</a:t>
+            </a:r>
+            <a:endParaRPr lang="ko-KR" altLang="en-US" sz="1100" dirty="0">
+              <a:solidFill>
+                <a:schemeClr val="tx1"/>
+              </a:solidFill>
+              <a:latin typeface="맑은 고딕" panose="020B0503020000020004" pitchFamily="50" charset="-127"/>
+              <a:ea typeface="맑은 고딕" panose="020B0503020000020004" pitchFamily="50" charset="-127"/>
+              <a:cs typeface="Gothic A1"/>
+              <a:sym typeface="Gothic A1"/>
+            </a:endParaRPr>
+          </a:p>
+        </p:txBody>
+      </p:sp>
+      <p:graphicFrame>
+        <p:nvGraphicFramePr>
+          <p:cNvPr id="2" name="표 1">
+            <a:extLst>
+              <a:ext uri="{FF2B5EF4-FFF2-40B4-BE49-F238E27FC236}">
+                <a16:creationId xmlns:a16="http://schemas.microsoft.com/office/drawing/2014/main" id="{71681EEB-1BBE-CDD7-1369-3A028EB40628}"/>
+              </a:ext>
+            </a:extLst>
+          </p:cNvPr>
+          <p:cNvGraphicFramePr>
+            <a:graphicFrameLocks noGrp="1"/>
+          </p:cNvGraphicFramePr>
+          <p:nvPr>
+            <p:extLst>
+              <p:ext uri="{D42A27DB-BD31-4B8C-83A1-F6EECF244321}">
+                <p14:modId xmlns:p14="http://schemas.microsoft.com/office/powerpoint/2010/main" val="670420574"/>
+              </p:ext>
+            </p:extLst>
+          </p:nvPr>
+        </p:nvGraphicFramePr>
+        <p:xfrm>
+          <a:off x="325113" y="5547916"/>
+          <a:ext cx="6840153" cy="1406214"/>
+        </p:xfrm>
+        <a:graphic>
+          <a:graphicData uri="http://schemas.openxmlformats.org/drawingml/2006/table">
+            <a:tbl>
+              <a:tblPr firstRow="1" bandRow="1">
+                <a:tableStyleId>{5940675A-B579-460E-94D1-54222C63F5DA}</a:tableStyleId>
+              </a:tblPr>
+              <a:tblGrid>
+                <a:gridCol w="1415047">
+                  <a:extLst>
+                    <a:ext uri="{9D8B030D-6E8A-4147-A177-3AD203B41FA5}">
+                      <a16:colId xmlns:a16="http://schemas.microsoft.com/office/drawing/2014/main" val="20000"/>
+                    </a:ext>
+                  </a:extLst>
+                </a:gridCol>
+                <a:gridCol w="5425106">
+                  <a:extLst>
+                    <a:ext uri="{9D8B030D-6E8A-4147-A177-3AD203B41FA5}">
+                      <a16:colId xmlns:a16="http://schemas.microsoft.com/office/drawing/2014/main" val="20001"/>
+                    </a:ext>
+                  </a:extLst>
+                </a:gridCol>
+              </a:tblGrid>
+              <a:tr h="400374">
+                <a:tc>
+                  <a:txBody>
+                    <a:bodyPr/>
+                    <a:lstStyle/>
+                    <a:p>
+                      <a:pPr algn="ctr" latinLnBrk="1"/>
+                      <a:r>
+                        <a:rPr lang="ko-KR" altLang="en-US" sz="1200" b="0" i="0" u="none" strike="noStrike" cap="none" dirty="0">
+                          <a:solidFill>
+                            <a:schemeClr val="tx1"/>
+                          </a:solidFill>
+                          <a:latin typeface="맑은 고딕" panose="020B0503020000020004" pitchFamily="50" charset="-127"/>
+                          <a:ea typeface="맑은 고딕" panose="020B0503020000020004" pitchFamily="50" charset="-127"/>
+                          <a:cs typeface="+mn-cs"/>
+                          <a:sym typeface="Arial"/>
+                        </a:rPr>
+                        <a:t>어려웠던 점</a:t>
+                      </a:r>
+                      <a:endParaRPr lang="ko-KR" altLang="en-US" sz="1200" b="0" i="0" u="none" strike="noStrike" cap="none" dirty="0">
+                        <a:solidFill>
+                          <a:schemeClr val="tx1"/>
+                        </a:solidFill>
+                        <a:latin typeface="맑은 고딕" panose="020B0503020000020004" pitchFamily="50" charset="-127"/>
+                        <a:ea typeface="맑은 고딕" panose="020B0503020000020004" pitchFamily="50" charset="-127"/>
+                        <a:cs typeface="Gothic A1"/>
+                        <a:sym typeface="Arial"/>
+                      </a:endParaRPr>
+                    </a:p>
+                  </a:txBody>
+                  <a:tcPr anchor="ctr"/>
+                </a:tc>
+                <a:tc>
+                  <a:txBody>
+                    <a:bodyPr/>
+                    <a:lstStyle/>
+                    <a:p>
+                      <a:pPr marL="228600" indent="-228600" latinLnBrk="1">
+                        <a:buAutoNum type="arabicPeriod"/>
+                      </a:pPr>
+                      <a:endParaRPr lang="en-US" altLang="ko-KR" sz="1200" b="0" i="0" u="none" strike="noStrike" cap="none" dirty="0">
+                        <a:solidFill>
+                          <a:schemeClr val="tx1"/>
+                        </a:solidFill>
+                        <a:latin typeface="맑은 고딕" panose="020B0503020000020004" pitchFamily="50" charset="-127"/>
+                        <a:ea typeface="맑은 고딕" panose="020B0503020000020004" pitchFamily="50" charset="-127"/>
+                        <a:cs typeface="Gothic A1"/>
+                        <a:sym typeface="Arial"/>
+                      </a:endParaRPr>
+                    </a:p>
+                  </a:txBody>
+                  <a:tcPr anchor="ctr"/>
+                </a:tc>
+                <a:extLst>
+                  <a:ext uri="{0D108BD9-81ED-4DB2-BD59-A6C34878D82A}">
+                    <a16:rowId xmlns:a16="http://schemas.microsoft.com/office/drawing/2014/main" val="10000"/>
+                  </a:ext>
+                </a:extLst>
+              </a:tr>
+              <a:tr h="502920">
+                <a:tc>
+                  <a:txBody>
+                    <a:bodyPr/>
+                    <a:lstStyle/>
+                    <a:p>
+                      <a:pPr algn="ctr" latinLnBrk="1"/>
+                      <a:r>
+                        <a:rPr lang="ko-KR" altLang="en-US" sz="1200" b="0" i="0" u="none" strike="noStrike" cap="none" dirty="0">
+                          <a:solidFill>
+                            <a:schemeClr val="tx1"/>
+                          </a:solidFill>
+                          <a:latin typeface="맑은 고딕" panose="020B0503020000020004" pitchFamily="50" charset="-127"/>
+                          <a:ea typeface="맑은 고딕" panose="020B0503020000020004" pitchFamily="50" charset="-127"/>
+                          <a:cs typeface="Gothic A1"/>
+                          <a:sym typeface="Arial"/>
+                        </a:rPr>
+                        <a:t>느낀 점 및 개선점</a:t>
+                      </a:r>
+                    </a:p>
+                  </a:txBody>
+                  <a:tcPr anchor="ctr"/>
+                </a:tc>
+                <a:tc>
+                  <a:txBody>
+                    <a:bodyPr/>
+                    <a:lstStyle/>
+                    <a:p>
+                      <a:pPr marL="228600" indent="-228600" latinLnBrk="1">
+                        <a:buAutoNum type="arabicPeriod"/>
+                      </a:pPr>
+                      <a:endParaRPr lang="en-US" altLang="ko-KR" sz="1200" b="0" i="0" u="none" strike="noStrike" cap="none" dirty="0">
+                        <a:solidFill>
+                          <a:schemeClr val="tx1"/>
+                        </a:solidFill>
+                        <a:latin typeface="맑은 고딕" panose="020B0503020000020004" pitchFamily="50" charset="-127"/>
+                        <a:ea typeface="맑은 고딕" panose="020B0503020000020004" pitchFamily="50" charset="-127"/>
+                        <a:cs typeface="Gothic A1"/>
+                        <a:sym typeface="Arial"/>
+                      </a:endParaRPr>
+                    </a:p>
+                  </a:txBody>
+                  <a:tcPr anchor="ctr"/>
+                </a:tc>
+                <a:extLst>
+                  <a:ext uri="{0D108BD9-81ED-4DB2-BD59-A6C34878D82A}">
+                    <a16:rowId xmlns:a16="http://schemas.microsoft.com/office/drawing/2014/main" val="2186901959"/>
+                  </a:ext>
+                </a:extLst>
+              </a:tr>
+              <a:tr h="502920">
+                <a:tc>
+                  <a:txBody>
+                    <a:bodyPr/>
+                    <a:lstStyle/>
+                    <a:p>
+                      <a:pPr algn="ctr" latinLnBrk="1"/>
+                      <a:r>
+                        <a:rPr lang="ko-KR" altLang="en-US" sz="1200" b="0" i="0" u="none" strike="noStrike" cap="none" dirty="0">
+                          <a:solidFill>
+                            <a:schemeClr val="tx1"/>
+                          </a:solidFill>
+                          <a:latin typeface="맑은 고딕" panose="020B0503020000020004" pitchFamily="50" charset="-127"/>
+                          <a:ea typeface="맑은 고딕" panose="020B0503020000020004" pitchFamily="50" charset="-127"/>
+                          <a:cs typeface="Gothic A1"/>
+                          <a:sym typeface="Arial"/>
+                        </a:rPr>
+                        <a:t>총평</a:t>
+                      </a:r>
+                    </a:p>
+                  </a:txBody>
+                  <a:tcPr anchor="ctr"/>
+                </a:tc>
+                <a:tc>
+                  <a:txBody>
+                    <a:bodyPr/>
+                    <a:lstStyle/>
+                    <a:p>
+                      <a:pPr marL="0" indent="0" latinLnBrk="1">
+                        <a:buNone/>
+                      </a:pPr>
+                      <a:endParaRPr lang="en-US" altLang="ko-KR" sz="1200" b="0" i="0" u="none" strike="noStrike" cap="none" dirty="0">
+                        <a:solidFill>
+                          <a:schemeClr val="tx1"/>
+                        </a:solidFill>
+                        <a:latin typeface="맑은 고딕" panose="020B0503020000020004" pitchFamily="50" charset="-127"/>
+                        <a:ea typeface="맑은 고딕" panose="020B0503020000020004" pitchFamily="50" charset="-127"/>
+                        <a:cs typeface="Gothic A1"/>
+                        <a:sym typeface="Arial"/>
+                      </a:endParaRPr>
+                    </a:p>
+                  </a:txBody>
+                  <a:tcPr anchor="ctr"/>
+                </a:tc>
+                <a:extLst>
+                  <a:ext uri="{0D108BD9-81ED-4DB2-BD59-A6C34878D82A}">
+                    <a16:rowId xmlns:a16="http://schemas.microsoft.com/office/drawing/2014/main" val="3909126375"/>
+                  </a:ext>
+                </a:extLst>
+              </a:tr>
+            </a:tbl>
+          </a:graphicData>
+        </a:graphic>
+      </p:graphicFrame>
+    </p:spTree>
+    <p:extLst>
+      <p:ext uri="{BB962C8B-B14F-4D97-AF65-F5344CB8AC3E}">
+        <p14:creationId xmlns:p14="http://schemas.microsoft.com/office/powerpoint/2010/main" val="2751139003"/>
+      </p:ext>
+    </p:extLst>
+  </p:cSld>
+  <p:clrMapOvr>
+    <a:masterClrMapping/>
+  </p:clrMapOvr>
+</p:sld>
+</file>
+
 <file path=ppt/theme/theme1.xml><?xml version="1.0" encoding="utf-8"?>
 <a:theme xmlns:a="http://schemas.openxmlformats.org/drawingml/2006/main" name="Simple Light">
   <a:themeElements>

</xml_diff>